<commit_message>
Get tenantId from the http request.
</commit_message>
<xml_diff>
--- a/2018-01-06-Multi-Tenancy/Multi-Tenancy.pptx
+++ b/2018-01-06-Multi-Tenancy/Multi-Tenancy.pptx
@@ -5,10 +5,10 @@
     <p:sldMasterId id="2147483648" r:id="rId1"/>
   </p:sldMasterIdLst>
   <p:notesMasterIdLst>
-    <p:notesMasterId r:id="rId31"/>
+    <p:notesMasterId r:id="rId35"/>
   </p:notesMasterIdLst>
   <p:handoutMasterIdLst>
-    <p:handoutMasterId r:id="rId32"/>
+    <p:handoutMasterId r:id="rId36"/>
   </p:handoutMasterIdLst>
   <p:sldIdLst>
     <p:sldId id="261" r:id="rId2"/>
@@ -36,10 +36,14 @@
     <p:sldId id="285" r:id="rId24"/>
     <p:sldId id="286" r:id="rId25"/>
     <p:sldId id="288" r:id="rId26"/>
-    <p:sldId id="289" r:id="rId27"/>
-    <p:sldId id="269" r:id="rId28"/>
-    <p:sldId id="270" r:id="rId29"/>
-    <p:sldId id="276" r:id="rId30"/>
+    <p:sldId id="294" r:id="rId27"/>
+    <p:sldId id="289" r:id="rId28"/>
+    <p:sldId id="295" r:id="rId29"/>
+    <p:sldId id="296" r:id="rId30"/>
+    <p:sldId id="297" r:id="rId31"/>
+    <p:sldId id="269" r:id="rId32"/>
+    <p:sldId id="270" r:id="rId33"/>
+    <p:sldId id="276" r:id="rId34"/>
   </p:sldIdLst>
   <p:sldSz cx="12192000" cy="6858000"/>
   <p:notesSz cx="6858000" cy="9144000"/>
@@ -17317,38 +17321,79 @@
         </p:nvSpPr>
         <p:spPr/>
         <p:txBody>
-          <a:bodyPr/>
+          <a:bodyPr anchor="t"/>
           <a:lstStyle/>
           <a:p>
-            <a:endParaRPr lang="tr-TR"/>
+            <a:r>
+              <a:rPr lang="en-US" dirty="0"/>
+              <a:t>Change Current Tenant</a:t>
+            </a:r>
+            <a:endParaRPr lang="tr-TR" dirty="0"/>
           </a:p>
         </p:txBody>
       </p:sp>
-      <p:sp>
-        <p:nvSpPr>
-          <p:cNvPr id="3" name="Content Placeholder 2">
+      <p:pic>
+        <p:nvPicPr>
+          <p:cNvPr id="4" name="Content Placeholder 3">
             <a:extLst>
               <a:ext uri="{FF2B5EF4-FFF2-40B4-BE49-F238E27FC236}">
-                <a16:creationId xmlns:a16="http://schemas.microsoft.com/office/drawing/2014/main" id="{66046F11-BE20-41C5-B635-A7989782F4AD}"/>
+                <a16:creationId xmlns:a16="http://schemas.microsoft.com/office/drawing/2014/main" id="{373B8597-BDF7-40FB-AC6A-15DE7E5587C1}"/>
               </a:ext>
             </a:extLst>
           </p:cNvPr>
-          <p:cNvSpPr>
-            <a:spLocks noGrp="1"/>
-          </p:cNvSpPr>
+          <p:cNvPicPr>
+            <a:picLocks noGrp="1" noChangeAspect="1"/>
+          </p:cNvPicPr>
           <p:nvPr>
             <p:ph idx="1"/>
           </p:nvPr>
-        </p:nvSpPr>
-        <p:spPr/>
-        <p:txBody>
-          <a:bodyPr/>
-          <a:lstStyle/>
-          <a:p>
-            <a:endParaRPr lang="tr-TR"/>
-          </a:p>
-        </p:txBody>
-      </p:sp>
+        </p:nvPicPr>
+        <p:blipFill>
+          <a:blip r:embed="rId2"/>
+          <a:stretch>
+            <a:fillRect/>
+          </a:stretch>
+        </p:blipFill>
+        <p:spPr>
+          <a:xfrm>
+            <a:off x="679579" y="1396188"/>
+            <a:ext cx="6522125" cy="2569322"/>
+          </a:xfrm>
+          <a:prstGeom prst="rect">
+            <a:avLst/>
+          </a:prstGeom>
+        </p:spPr>
+      </p:pic>
+      <p:pic>
+        <p:nvPicPr>
+          <p:cNvPr id="5" name="Picture 4">
+            <a:extLst>
+              <a:ext uri="{FF2B5EF4-FFF2-40B4-BE49-F238E27FC236}">
+                <a16:creationId xmlns:a16="http://schemas.microsoft.com/office/drawing/2014/main" id="{23950193-A7C2-479B-94DA-707668555B02}"/>
+              </a:ext>
+            </a:extLst>
+          </p:cNvPr>
+          <p:cNvPicPr>
+            <a:picLocks noChangeAspect="1"/>
+          </p:cNvPicPr>
+          <p:nvPr/>
+        </p:nvPicPr>
+        <p:blipFill>
+          <a:blip r:embed="rId3"/>
+          <a:stretch>
+            <a:fillRect/>
+          </a:stretch>
+        </p:blipFill>
+        <p:spPr>
+          <a:xfrm>
+            <a:off x="7201704" y="1396188"/>
+            <a:ext cx="4310716" cy="3512876"/>
+          </a:xfrm>
+          <a:prstGeom prst="rect">
+            <a:avLst/>
+          </a:prstGeom>
+        </p:spPr>
+      </p:pic>
     </p:spTree>
     <p:extLst>
       <p:ext uri="{BB962C8B-B14F-4D97-AF65-F5344CB8AC3E}">
@@ -17396,6 +17441,109 @@
           <p:cNvPr id="2" name="Title 1">
             <a:extLst>
               <a:ext uri="{FF2B5EF4-FFF2-40B4-BE49-F238E27FC236}">
+                <a16:creationId xmlns:a16="http://schemas.microsoft.com/office/drawing/2014/main" id="{87A03D3C-AAF6-4F1C-940A-AD638760CBF8}"/>
+              </a:ext>
+            </a:extLst>
+          </p:cNvPr>
+          <p:cNvSpPr>
+            <a:spLocks noGrp="1"/>
+          </p:cNvSpPr>
+          <p:nvPr>
+            <p:ph type="title"/>
+          </p:nvPr>
+        </p:nvSpPr>
+        <p:spPr/>
+        <p:txBody>
+          <a:bodyPr anchor="t"/>
+          <a:lstStyle/>
+          <a:p>
+            <a:r>
+              <a:rPr lang="en-US" dirty="0"/>
+              <a:t>Change Current Tenant</a:t>
+            </a:r>
+            <a:endParaRPr lang="tr-TR" dirty="0"/>
+          </a:p>
+        </p:txBody>
+      </p:sp>
+      <p:pic>
+        <p:nvPicPr>
+          <p:cNvPr id="5" name="Content Placeholder 4">
+            <a:extLst>
+              <a:ext uri="{FF2B5EF4-FFF2-40B4-BE49-F238E27FC236}">
+                <a16:creationId xmlns:a16="http://schemas.microsoft.com/office/drawing/2014/main" id="{5AF110C9-A796-41AE-A722-6029F176CBC2}"/>
+              </a:ext>
+            </a:extLst>
+          </p:cNvPr>
+          <p:cNvPicPr>
+            <a:picLocks noGrp="1" noChangeAspect="1"/>
+          </p:cNvPicPr>
+          <p:nvPr>
+            <p:ph idx="1"/>
+          </p:nvPr>
+        </p:nvPicPr>
+        <p:blipFill>
+          <a:blip r:embed="rId2"/>
+          <a:stretch>
+            <a:fillRect/>
+          </a:stretch>
+        </p:blipFill>
+        <p:spPr>
+          <a:xfrm>
+            <a:off x="1295400" y="1117033"/>
+            <a:ext cx="8371114" cy="5446424"/>
+          </a:xfrm>
+          <a:prstGeom prst="rect">
+            <a:avLst/>
+          </a:prstGeom>
+        </p:spPr>
+      </p:pic>
+    </p:spTree>
+    <p:extLst>
+      <p:ext uri="{BB962C8B-B14F-4D97-AF65-F5344CB8AC3E}">
+        <p14:creationId xmlns:p14="http://schemas.microsoft.com/office/powerpoint/2010/main" val="4262723001"/>
+      </p:ext>
+    </p:extLst>
+  </p:cSld>
+  <p:clrMapOvr>
+    <a:masterClrMapping/>
+  </p:clrMapOvr>
+  <mc:AlternateContent xmlns:mc="http://schemas.openxmlformats.org/markup-compatibility/2006" xmlns:p14="http://schemas.microsoft.com/office/powerpoint/2010/main">
+    <mc:Choice Requires="p14">
+      <p:transition spd="med" p14:dur="700">
+        <p:fade/>
+      </p:transition>
+    </mc:Choice>
+    <mc:Fallback xmlns="">
+      <p:transition spd="med">
+        <p:fade/>
+      </p:transition>
+    </mc:Fallback>
+  </mc:AlternateContent>
+</p:sld>
+</file>
+
+<file path=ppt/slides/slide27.xml><?xml version="1.0" encoding="utf-8"?>
+<p:sld xmlns:a="http://schemas.openxmlformats.org/drawingml/2006/main" xmlns:r="http://schemas.openxmlformats.org/officeDocument/2006/relationships" xmlns:p="http://schemas.openxmlformats.org/presentationml/2006/main">
+  <p:cSld>
+    <p:spTree>
+      <p:nvGrpSpPr>
+        <p:cNvPr id="1" name=""/>
+        <p:cNvGrpSpPr/>
+        <p:nvPr/>
+      </p:nvGrpSpPr>
+      <p:grpSpPr>
+        <a:xfrm>
+          <a:off x="0" y="0"/>
+          <a:ext cx="0" cy="0"/>
+          <a:chOff x="0" y="0"/>
+          <a:chExt cx="0" cy="0"/>
+        </a:xfrm>
+      </p:grpSpPr>
+      <p:sp>
+        <p:nvSpPr>
+          <p:cNvPr id="2" name="Title 1">
+            <a:extLst>
+              <a:ext uri="{FF2B5EF4-FFF2-40B4-BE49-F238E27FC236}">
                 <a16:creationId xmlns:a16="http://schemas.microsoft.com/office/drawing/2014/main" id="{5061DD94-16DC-4501-926E-9657E8BF76EC}"/>
               </a:ext>
             </a:extLst>
@@ -17409,38 +17557,49 @@
         </p:nvSpPr>
         <p:spPr/>
         <p:txBody>
-          <a:bodyPr/>
+          <a:bodyPr anchor="t"/>
           <a:lstStyle/>
           <a:p>
-            <a:endParaRPr lang="tr-TR"/>
+            <a:r>
+              <a:rPr lang="en-US" dirty="0"/>
+              <a:t>Change Current Tenant (Nested)</a:t>
+            </a:r>
+            <a:endParaRPr lang="tr-TR" dirty="0"/>
           </a:p>
         </p:txBody>
       </p:sp>
-      <p:sp>
-        <p:nvSpPr>
-          <p:cNvPr id="3" name="Content Placeholder 2">
+      <p:pic>
+        <p:nvPicPr>
+          <p:cNvPr id="4" name="Content Placeholder 3">
             <a:extLst>
               <a:ext uri="{FF2B5EF4-FFF2-40B4-BE49-F238E27FC236}">
-                <a16:creationId xmlns:a16="http://schemas.microsoft.com/office/drawing/2014/main" id="{F31AA907-71A4-4CEE-815F-B08AD876414B}"/>
+                <a16:creationId xmlns:a16="http://schemas.microsoft.com/office/drawing/2014/main" id="{FF3805F6-0980-4A73-AB9E-9ACF7673617B}"/>
               </a:ext>
             </a:extLst>
           </p:cNvPr>
-          <p:cNvSpPr>
-            <a:spLocks noGrp="1"/>
-          </p:cNvSpPr>
+          <p:cNvPicPr>
+            <a:picLocks noGrp="1" noChangeAspect="1"/>
+          </p:cNvPicPr>
           <p:nvPr>
             <p:ph idx="1"/>
           </p:nvPr>
-        </p:nvSpPr>
-        <p:spPr/>
-        <p:txBody>
-          <a:bodyPr/>
-          <a:lstStyle/>
-          <a:p>
-            <a:endParaRPr lang="tr-TR"/>
-          </a:p>
-        </p:txBody>
-      </p:sp>
+        </p:nvPicPr>
+        <p:blipFill>
+          <a:blip r:embed="rId2"/>
+          <a:stretch>
+            <a:fillRect/>
+          </a:stretch>
+        </p:blipFill>
+        <p:spPr>
+          <a:xfrm>
+            <a:off x="670203" y="1573860"/>
+            <a:ext cx="10851594" cy="3893879"/>
+          </a:xfrm>
+          <a:prstGeom prst="rect">
+            <a:avLst/>
+          </a:prstGeom>
+        </p:spPr>
+      </p:pic>
     </p:spTree>
     <p:extLst>
       <p:ext uri="{BB962C8B-B14F-4D97-AF65-F5344CB8AC3E}">
@@ -17466,7 +17625,444 @@
 </p:sld>
 </file>
 
-<file path=ppt/slides/slide27.xml><?xml version="1.0" encoding="utf-8"?>
+<file path=ppt/slides/slide28.xml><?xml version="1.0" encoding="utf-8"?>
+<p:sld xmlns:a="http://schemas.openxmlformats.org/drawingml/2006/main" xmlns:r="http://schemas.openxmlformats.org/officeDocument/2006/relationships" xmlns:p="http://schemas.openxmlformats.org/presentationml/2006/main">
+  <p:cSld>
+    <p:spTree>
+      <p:nvGrpSpPr>
+        <p:cNvPr id="1" name=""/>
+        <p:cNvGrpSpPr/>
+        <p:nvPr/>
+      </p:nvGrpSpPr>
+      <p:grpSpPr>
+        <a:xfrm>
+          <a:off x="0" y="0"/>
+          <a:ext cx="0" cy="0"/>
+          <a:chOff x="0" y="0"/>
+          <a:chExt cx="0" cy="0"/>
+        </a:xfrm>
+      </p:grpSpPr>
+      <p:sp>
+        <p:nvSpPr>
+          <p:cNvPr id="2" name="Title 1">
+            <a:extLst>
+              <a:ext uri="{FF2B5EF4-FFF2-40B4-BE49-F238E27FC236}">
+                <a16:creationId xmlns:a16="http://schemas.microsoft.com/office/drawing/2014/main" id="{98AD1489-7F8E-47CF-B6DC-18F6B5F1873E}"/>
+              </a:ext>
+            </a:extLst>
+          </p:cNvPr>
+          <p:cNvSpPr>
+            <a:spLocks noGrp="1"/>
+          </p:cNvSpPr>
+          <p:nvPr>
+            <p:ph type="title"/>
+          </p:nvPr>
+        </p:nvSpPr>
+        <p:spPr/>
+        <p:txBody>
+          <a:bodyPr/>
+          <a:lstStyle/>
+          <a:p>
+            <a:endParaRPr lang="tr-TR"/>
+          </a:p>
+        </p:txBody>
+      </p:sp>
+      <p:sp>
+        <p:nvSpPr>
+          <p:cNvPr id="3" name="Content Placeholder 2">
+            <a:extLst>
+              <a:ext uri="{FF2B5EF4-FFF2-40B4-BE49-F238E27FC236}">
+                <a16:creationId xmlns:a16="http://schemas.microsoft.com/office/drawing/2014/main" id="{EEFCF407-9159-4799-A0D7-713BF45CDB5D}"/>
+              </a:ext>
+            </a:extLst>
+          </p:cNvPr>
+          <p:cNvSpPr>
+            <a:spLocks noGrp="1"/>
+          </p:cNvSpPr>
+          <p:nvPr>
+            <p:ph idx="1"/>
+          </p:nvPr>
+        </p:nvSpPr>
+        <p:spPr/>
+        <p:txBody>
+          <a:bodyPr/>
+          <a:lstStyle/>
+          <a:p>
+            <a:endParaRPr lang="tr-TR"/>
+          </a:p>
+        </p:txBody>
+      </p:sp>
+    </p:spTree>
+    <p:extLst>
+      <p:ext uri="{BB962C8B-B14F-4D97-AF65-F5344CB8AC3E}">
+        <p14:creationId xmlns:p14="http://schemas.microsoft.com/office/powerpoint/2010/main" val="1014193435"/>
+      </p:ext>
+    </p:extLst>
+  </p:cSld>
+  <p:clrMapOvr>
+    <a:masterClrMapping/>
+  </p:clrMapOvr>
+  <mc:AlternateContent xmlns:mc="http://schemas.openxmlformats.org/markup-compatibility/2006" xmlns:p14="http://schemas.microsoft.com/office/powerpoint/2010/main">
+    <mc:Choice Requires="p14">
+      <p:transition spd="med" p14:dur="700">
+        <p:fade/>
+      </p:transition>
+    </mc:Choice>
+    <mc:Fallback xmlns="">
+      <p:transition spd="med">
+        <p:fade/>
+      </p:transition>
+    </mc:Fallback>
+  </mc:AlternateContent>
+</p:sld>
+</file>
+
+<file path=ppt/slides/slide29.xml><?xml version="1.0" encoding="utf-8"?>
+<p:sld xmlns:a="http://schemas.openxmlformats.org/drawingml/2006/main" xmlns:r="http://schemas.openxmlformats.org/officeDocument/2006/relationships" xmlns:p="http://schemas.openxmlformats.org/presentationml/2006/main">
+  <p:cSld>
+    <p:spTree>
+      <p:nvGrpSpPr>
+        <p:cNvPr id="1" name=""/>
+        <p:cNvGrpSpPr/>
+        <p:nvPr/>
+      </p:nvGrpSpPr>
+      <p:grpSpPr>
+        <a:xfrm>
+          <a:off x="0" y="0"/>
+          <a:ext cx="0" cy="0"/>
+          <a:chOff x="0" y="0"/>
+          <a:chExt cx="0" cy="0"/>
+        </a:xfrm>
+      </p:grpSpPr>
+      <p:sp>
+        <p:nvSpPr>
+          <p:cNvPr id="2" name="Title 1">
+            <a:extLst>
+              <a:ext uri="{FF2B5EF4-FFF2-40B4-BE49-F238E27FC236}">
+                <a16:creationId xmlns:a16="http://schemas.microsoft.com/office/drawing/2014/main" id="{A8E87594-8274-430A-9526-7D91EBAE4A90}"/>
+              </a:ext>
+            </a:extLst>
+          </p:cNvPr>
+          <p:cNvSpPr>
+            <a:spLocks noGrp="1"/>
+          </p:cNvSpPr>
+          <p:nvPr>
+            <p:ph type="title"/>
+          </p:nvPr>
+        </p:nvSpPr>
+        <p:spPr/>
+        <p:txBody>
+          <a:bodyPr/>
+          <a:lstStyle/>
+          <a:p>
+            <a:endParaRPr lang="tr-TR"/>
+          </a:p>
+        </p:txBody>
+      </p:sp>
+      <p:sp>
+        <p:nvSpPr>
+          <p:cNvPr id="3" name="Content Placeholder 2">
+            <a:extLst>
+              <a:ext uri="{FF2B5EF4-FFF2-40B4-BE49-F238E27FC236}">
+                <a16:creationId xmlns:a16="http://schemas.microsoft.com/office/drawing/2014/main" id="{DECA2F4C-D44D-44D7-8B73-056245C90E29}"/>
+              </a:ext>
+            </a:extLst>
+          </p:cNvPr>
+          <p:cNvSpPr>
+            <a:spLocks noGrp="1"/>
+          </p:cNvSpPr>
+          <p:nvPr>
+            <p:ph idx="1"/>
+          </p:nvPr>
+        </p:nvSpPr>
+        <p:spPr/>
+        <p:txBody>
+          <a:bodyPr/>
+          <a:lstStyle/>
+          <a:p>
+            <a:endParaRPr lang="tr-TR"/>
+          </a:p>
+        </p:txBody>
+      </p:sp>
+    </p:spTree>
+    <p:extLst>
+      <p:ext uri="{BB962C8B-B14F-4D97-AF65-F5344CB8AC3E}">
+        <p14:creationId xmlns:p14="http://schemas.microsoft.com/office/powerpoint/2010/main" val="271060063"/>
+      </p:ext>
+    </p:extLst>
+  </p:cSld>
+  <p:clrMapOvr>
+    <a:masterClrMapping/>
+  </p:clrMapOvr>
+  <mc:AlternateContent xmlns:mc="http://schemas.openxmlformats.org/markup-compatibility/2006" xmlns:p14="http://schemas.microsoft.com/office/powerpoint/2010/main">
+    <mc:Choice Requires="p14">
+      <p:transition spd="med" p14:dur="700">
+        <p:fade/>
+      </p:transition>
+    </mc:Choice>
+    <mc:Fallback xmlns="">
+      <p:transition spd="med">
+        <p:fade/>
+      </p:transition>
+    </mc:Fallback>
+  </mc:AlternateContent>
+</p:sld>
+</file>
+
+<file path=ppt/slides/slide3.xml><?xml version="1.0" encoding="utf-8"?>
+<p:sld xmlns:a="http://schemas.openxmlformats.org/drawingml/2006/main" xmlns:r="http://schemas.openxmlformats.org/officeDocument/2006/relationships" xmlns:p="http://schemas.openxmlformats.org/presentationml/2006/main">
+  <p:cSld>
+    <p:spTree>
+      <p:nvGrpSpPr>
+        <p:cNvPr id="1" name=""/>
+        <p:cNvGrpSpPr/>
+        <p:nvPr/>
+      </p:nvGrpSpPr>
+      <p:grpSpPr>
+        <a:xfrm>
+          <a:off x="0" y="0"/>
+          <a:ext cx="0" cy="0"/>
+          <a:chOff x="0" y="0"/>
+          <a:chExt cx="0" cy="0"/>
+        </a:xfrm>
+      </p:grpSpPr>
+      <p:sp>
+        <p:nvSpPr>
+          <p:cNvPr id="2" name="Title 1"/>
+          <p:cNvSpPr>
+            <a:spLocks noGrp="1"/>
+          </p:cNvSpPr>
+          <p:nvPr>
+            <p:ph type="title"/>
+          </p:nvPr>
+        </p:nvSpPr>
+        <p:spPr>
+          <a:xfrm>
+            <a:off x="622010" y="319295"/>
+            <a:ext cx="9601200" cy="637050"/>
+          </a:xfrm>
+        </p:spPr>
+        <p:txBody>
+          <a:bodyPr/>
+          <a:lstStyle/>
+          <a:p>
+            <a:r>
+              <a:rPr lang="en-US" dirty="0"/>
+              <a:t>Halil İbrahim Kalkan</a:t>
+            </a:r>
+          </a:p>
+        </p:txBody>
+      </p:sp>
+      <p:sp>
+        <p:nvSpPr>
+          <p:cNvPr id="3" name="Content Placeholder 2"/>
+          <p:cNvSpPr>
+            <a:spLocks noGrp="1"/>
+          </p:cNvSpPr>
+          <p:nvPr>
+            <p:ph idx="1"/>
+          </p:nvPr>
+        </p:nvSpPr>
+        <p:spPr>
+          <a:xfrm>
+            <a:off x="622010" y="1058412"/>
+            <a:ext cx="9601200" cy="3809999"/>
+          </a:xfrm>
+        </p:spPr>
+        <p:txBody>
+          <a:bodyPr/>
+          <a:lstStyle/>
+          <a:p>
+            <a:r>
+              <a:rPr lang="en-US" sz="1200" dirty="0"/>
+              <a:t>@hikalkan</a:t>
+            </a:r>
+            <a:br>
+              <a:rPr lang="en-US" sz="1200" dirty="0"/>
+            </a:br>
+            <a:r>
+              <a:rPr lang="en-US" sz="1200" dirty="0"/>
+              <a:t>(</a:t>
+            </a:r>
+            <a:r>
+              <a:rPr lang="en-US" sz="1200" dirty="0" err="1"/>
+              <a:t>github</a:t>
+            </a:r>
+            <a:r>
+              <a:rPr lang="en-US" sz="1200" dirty="0"/>
+              <a:t>)</a:t>
+            </a:r>
+          </a:p>
+          <a:p>
+            <a:r>
+              <a:rPr lang="en-US" sz="1200" dirty="0"/>
+              <a:t>@</a:t>
+            </a:r>
+            <a:r>
+              <a:rPr lang="en-US" sz="1200" dirty="0" err="1"/>
+              <a:t>hibrahimkalkan</a:t>
+            </a:r>
+            <a:endParaRPr lang="en-US" sz="1200" dirty="0"/>
+          </a:p>
+          <a:p>
+            <a:r>
+              <a:rPr lang="en-US" sz="1200" dirty="0"/>
+              <a:t>http://halilibrahimkalkan.com</a:t>
+            </a:r>
+          </a:p>
+          <a:p>
+            <a:endParaRPr lang="en-US" dirty="0"/>
+          </a:p>
+        </p:txBody>
+      </p:sp>
+      <p:pic>
+        <p:nvPicPr>
+          <p:cNvPr id="4" name="Picture 3">
+            <a:extLst>
+              <a:ext uri="{FF2B5EF4-FFF2-40B4-BE49-F238E27FC236}">
+                <a16:creationId xmlns:a16="http://schemas.microsoft.com/office/drawing/2014/main" id="{D3A05A87-42AF-4CC6-8AE1-E683106FFB38}"/>
+              </a:ext>
+            </a:extLst>
+          </p:cNvPr>
+          <p:cNvPicPr>
+            <a:picLocks noChangeAspect="1"/>
+          </p:cNvPicPr>
+          <p:nvPr/>
+        </p:nvPicPr>
+        <p:blipFill>
+          <a:blip r:embed="rId3"/>
+          <a:stretch>
+            <a:fillRect/>
+          </a:stretch>
+        </p:blipFill>
+        <p:spPr>
+          <a:xfrm>
+            <a:off x="3215270" y="956345"/>
+            <a:ext cx="8354720" cy="5110249"/>
+          </a:xfrm>
+          <a:prstGeom prst="rect">
+            <a:avLst/>
+          </a:prstGeom>
+        </p:spPr>
+      </p:pic>
+    </p:spTree>
+    <p:extLst>
+      <p:ext uri="{BB962C8B-B14F-4D97-AF65-F5344CB8AC3E}">
+        <p14:creationId xmlns:p14="http://schemas.microsoft.com/office/powerpoint/2010/main" val="3984617762"/>
+      </p:ext>
+    </p:extLst>
+  </p:cSld>
+  <p:clrMapOvr>
+    <a:masterClrMapping/>
+  </p:clrMapOvr>
+  <mc:AlternateContent xmlns:mc="http://schemas.openxmlformats.org/markup-compatibility/2006" xmlns:p14="http://schemas.microsoft.com/office/powerpoint/2010/main">
+    <mc:Choice Requires="p14">
+      <p:transition spd="med" p14:dur="700">
+        <p:fade/>
+      </p:transition>
+    </mc:Choice>
+    <mc:Fallback xmlns="">
+      <p:transition spd="med">
+        <p:fade/>
+      </p:transition>
+    </mc:Fallback>
+  </mc:AlternateContent>
+</p:sld>
+</file>
+
+<file path=ppt/slides/slide30.xml><?xml version="1.0" encoding="utf-8"?>
+<p:sld xmlns:a="http://schemas.openxmlformats.org/drawingml/2006/main" xmlns:r="http://schemas.openxmlformats.org/officeDocument/2006/relationships" xmlns:p="http://schemas.openxmlformats.org/presentationml/2006/main">
+  <p:cSld>
+    <p:spTree>
+      <p:nvGrpSpPr>
+        <p:cNvPr id="1" name=""/>
+        <p:cNvGrpSpPr/>
+        <p:nvPr/>
+      </p:nvGrpSpPr>
+      <p:grpSpPr>
+        <a:xfrm>
+          <a:off x="0" y="0"/>
+          <a:ext cx="0" cy="0"/>
+          <a:chOff x="0" y="0"/>
+          <a:chExt cx="0" cy="0"/>
+        </a:xfrm>
+      </p:grpSpPr>
+      <p:sp>
+        <p:nvSpPr>
+          <p:cNvPr id="2" name="Title 1">
+            <a:extLst>
+              <a:ext uri="{FF2B5EF4-FFF2-40B4-BE49-F238E27FC236}">
+                <a16:creationId xmlns:a16="http://schemas.microsoft.com/office/drawing/2014/main" id="{B225C1C4-AE2E-412F-B140-2E867D326509}"/>
+              </a:ext>
+            </a:extLst>
+          </p:cNvPr>
+          <p:cNvSpPr>
+            <a:spLocks noGrp="1"/>
+          </p:cNvSpPr>
+          <p:nvPr>
+            <p:ph type="title"/>
+          </p:nvPr>
+        </p:nvSpPr>
+        <p:spPr/>
+        <p:txBody>
+          <a:bodyPr/>
+          <a:lstStyle/>
+          <a:p>
+            <a:endParaRPr lang="tr-TR"/>
+          </a:p>
+        </p:txBody>
+      </p:sp>
+      <p:sp>
+        <p:nvSpPr>
+          <p:cNvPr id="3" name="Content Placeholder 2">
+            <a:extLst>
+              <a:ext uri="{FF2B5EF4-FFF2-40B4-BE49-F238E27FC236}">
+                <a16:creationId xmlns:a16="http://schemas.microsoft.com/office/drawing/2014/main" id="{BF821C1A-D224-4AC1-84D3-CE27CE7180C3}"/>
+              </a:ext>
+            </a:extLst>
+          </p:cNvPr>
+          <p:cNvSpPr>
+            <a:spLocks noGrp="1"/>
+          </p:cNvSpPr>
+          <p:nvPr>
+            <p:ph idx="1"/>
+          </p:nvPr>
+        </p:nvSpPr>
+        <p:spPr/>
+        <p:txBody>
+          <a:bodyPr/>
+          <a:lstStyle/>
+          <a:p>
+            <a:endParaRPr lang="tr-TR"/>
+          </a:p>
+        </p:txBody>
+      </p:sp>
+    </p:spTree>
+    <p:extLst>
+      <p:ext uri="{BB962C8B-B14F-4D97-AF65-F5344CB8AC3E}">
+        <p14:creationId xmlns:p14="http://schemas.microsoft.com/office/powerpoint/2010/main" val="150459125"/>
+      </p:ext>
+    </p:extLst>
+  </p:cSld>
+  <p:clrMapOvr>
+    <a:masterClrMapping/>
+  </p:clrMapOvr>
+  <mc:AlternateContent xmlns:mc="http://schemas.openxmlformats.org/markup-compatibility/2006" xmlns:p14="http://schemas.microsoft.com/office/powerpoint/2010/main">
+    <mc:Choice Requires="p14">
+      <p:transition spd="med" p14:dur="700">
+        <p:fade/>
+      </p:transition>
+    </mc:Choice>
+    <mc:Fallback xmlns="">
+      <p:transition spd="med">
+        <p:fade/>
+      </p:transition>
+    </mc:Fallback>
+  </mc:AlternateContent>
+</p:sld>
+</file>
+
+<file path=ppt/slides/slide31.xml><?xml version="1.0" encoding="utf-8"?>
 <p:sld xmlns:a="http://schemas.openxmlformats.org/drawingml/2006/main" xmlns:r="http://schemas.openxmlformats.org/officeDocument/2006/relationships" xmlns:p="http://schemas.openxmlformats.org/presentationml/2006/main">
   <p:cSld>
     <p:spTree>
@@ -17568,7 +18164,7 @@
 </p:sld>
 </file>
 
-<file path=ppt/slides/slide28.xml><?xml version="1.0" encoding="utf-8"?>
+<file path=ppt/slides/slide32.xml><?xml version="1.0" encoding="utf-8"?>
 <p:sld xmlns:a="http://schemas.openxmlformats.org/drawingml/2006/main" xmlns:r="http://schemas.openxmlformats.org/officeDocument/2006/relationships" xmlns:p="http://schemas.openxmlformats.org/presentationml/2006/main">
   <p:cSld>
     <p:spTree>
@@ -17663,7 +18259,7 @@
 </p:sld>
 </file>
 
-<file path=ppt/slides/slide29.xml><?xml version="1.0" encoding="utf-8"?>
+<file path=ppt/slides/slide33.xml><?xml version="1.0" encoding="utf-8"?>
 <p:sld xmlns:a="http://schemas.openxmlformats.org/drawingml/2006/main" xmlns:r="http://schemas.openxmlformats.org/officeDocument/2006/relationships" xmlns:p="http://schemas.openxmlformats.org/presentationml/2006/main">
   <p:cSld>
     <p:spTree>
@@ -17734,167 +18330,6 @@
     <p:extLst>
       <p:ext uri="{BB962C8B-B14F-4D97-AF65-F5344CB8AC3E}">
         <p14:creationId xmlns:p14="http://schemas.microsoft.com/office/powerpoint/2010/main" val="4093661547"/>
-      </p:ext>
-    </p:extLst>
-  </p:cSld>
-  <p:clrMapOvr>
-    <a:masterClrMapping/>
-  </p:clrMapOvr>
-  <mc:AlternateContent xmlns:mc="http://schemas.openxmlformats.org/markup-compatibility/2006" xmlns:p14="http://schemas.microsoft.com/office/powerpoint/2010/main">
-    <mc:Choice Requires="p14">
-      <p:transition spd="med" p14:dur="700">
-        <p:fade/>
-      </p:transition>
-    </mc:Choice>
-    <mc:Fallback xmlns="">
-      <p:transition spd="med">
-        <p:fade/>
-      </p:transition>
-    </mc:Fallback>
-  </mc:AlternateContent>
-</p:sld>
-</file>
-
-<file path=ppt/slides/slide3.xml><?xml version="1.0" encoding="utf-8"?>
-<p:sld xmlns:a="http://schemas.openxmlformats.org/drawingml/2006/main" xmlns:r="http://schemas.openxmlformats.org/officeDocument/2006/relationships" xmlns:p="http://schemas.openxmlformats.org/presentationml/2006/main">
-  <p:cSld>
-    <p:spTree>
-      <p:nvGrpSpPr>
-        <p:cNvPr id="1" name=""/>
-        <p:cNvGrpSpPr/>
-        <p:nvPr/>
-      </p:nvGrpSpPr>
-      <p:grpSpPr>
-        <a:xfrm>
-          <a:off x="0" y="0"/>
-          <a:ext cx="0" cy="0"/>
-          <a:chOff x="0" y="0"/>
-          <a:chExt cx="0" cy="0"/>
-        </a:xfrm>
-      </p:grpSpPr>
-      <p:sp>
-        <p:nvSpPr>
-          <p:cNvPr id="2" name="Title 1"/>
-          <p:cNvSpPr>
-            <a:spLocks noGrp="1"/>
-          </p:cNvSpPr>
-          <p:nvPr>
-            <p:ph type="title"/>
-          </p:nvPr>
-        </p:nvSpPr>
-        <p:spPr>
-          <a:xfrm>
-            <a:off x="622010" y="319295"/>
-            <a:ext cx="9601200" cy="637050"/>
-          </a:xfrm>
-        </p:spPr>
-        <p:txBody>
-          <a:bodyPr/>
-          <a:lstStyle/>
-          <a:p>
-            <a:r>
-              <a:rPr lang="en-US" dirty="0"/>
-              <a:t>Halil İbrahim Kalkan</a:t>
-            </a:r>
-          </a:p>
-        </p:txBody>
-      </p:sp>
-      <p:sp>
-        <p:nvSpPr>
-          <p:cNvPr id="3" name="Content Placeholder 2"/>
-          <p:cNvSpPr>
-            <a:spLocks noGrp="1"/>
-          </p:cNvSpPr>
-          <p:nvPr>
-            <p:ph idx="1"/>
-          </p:nvPr>
-        </p:nvSpPr>
-        <p:spPr>
-          <a:xfrm>
-            <a:off x="622010" y="1058412"/>
-            <a:ext cx="9601200" cy="3809999"/>
-          </a:xfrm>
-        </p:spPr>
-        <p:txBody>
-          <a:bodyPr/>
-          <a:lstStyle/>
-          <a:p>
-            <a:r>
-              <a:rPr lang="en-US" sz="1200" dirty="0"/>
-              <a:t>@hikalkan</a:t>
-            </a:r>
-            <a:br>
-              <a:rPr lang="en-US" sz="1200" dirty="0"/>
-            </a:br>
-            <a:r>
-              <a:rPr lang="en-US" sz="1200" dirty="0"/>
-              <a:t>(</a:t>
-            </a:r>
-            <a:r>
-              <a:rPr lang="en-US" sz="1200" dirty="0" err="1"/>
-              <a:t>github</a:t>
-            </a:r>
-            <a:r>
-              <a:rPr lang="en-US" sz="1200" dirty="0"/>
-              <a:t>)</a:t>
-            </a:r>
-          </a:p>
-          <a:p>
-            <a:r>
-              <a:rPr lang="en-US" sz="1200" dirty="0"/>
-              <a:t>@</a:t>
-            </a:r>
-            <a:r>
-              <a:rPr lang="en-US" sz="1200" dirty="0" err="1"/>
-              <a:t>hibrahimkalkan</a:t>
-            </a:r>
-            <a:endParaRPr lang="en-US" sz="1200" dirty="0"/>
-          </a:p>
-          <a:p>
-            <a:r>
-              <a:rPr lang="en-US" sz="1200" dirty="0"/>
-              <a:t>http://halilibrahimkalkan.com</a:t>
-            </a:r>
-          </a:p>
-          <a:p>
-            <a:endParaRPr lang="en-US" dirty="0"/>
-          </a:p>
-        </p:txBody>
-      </p:sp>
-      <p:pic>
-        <p:nvPicPr>
-          <p:cNvPr id="4" name="Picture 3">
-            <a:extLst>
-              <a:ext uri="{FF2B5EF4-FFF2-40B4-BE49-F238E27FC236}">
-                <a16:creationId xmlns:a16="http://schemas.microsoft.com/office/drawing/2014/main" id="{D3A05A87-42AF-4CC6-8AE1-E683106FFB38}"/>
-              </a:ext>
-            </a:extLst>
-          </p:cNvPr>
-          <p:cNvPicPr>
-            <a:picLocks noChangeAspect="1"/>
-          </p:cNvPicPr>
-          <p:nvPr/>
-        </p:nvPicPr>
-        <p:blipFill>
-          <a:blip r:embed="rId3"/>
-          <a:stretch>
-            <a:fillRect/>
-          </a:stretch>
-        </p:blipFill>
-        <p:spPr>
-          <a:xfrm>
-            <a:off x="3215270" y="956345"/>
-            <a:ext cx="8354720" cy="5110249"/>
-          </a:xfrm>
-          <a:prstGeom prst="rect">
-            <a:avLst/>
-          </a:prstGeom>
-        </p:spPr>
-      </p:pic>
-    </p:spTree>
-    <p:extLst>
-      <p:ext uri="{BB962C8B-B14F-4D97-AF65-F5344CB8AC3E}">
-        <p14:creationId xmlns:p14="http://schemas.microsoft.com/office/powerpoint/2010/main" val="3984617762"/>
       </p:ext>
     </p:extLst>
   </p:cSld>

</xml_diff>

<commit_message>
Added dbcontext and migrations for demo.
</commit_message>
<xml_diff>
--- a/2018-01-06-Multi-Tenancy/Multi-Tenancy.pptx
+++ b/2018-01-06-Multi-Tenancy/Multi-Tenancy.pptx
@@ -5,10 +5,10 @@
     <p:sldMasterId id="2147483648" r:id="rId1"/>
   </p:sldMasterIdLst>
   <p:notesMasterIdLst>
-    <p:notesMasterId r:id="rId35"/>
+    <p:notesMasterId r:id="rId44"/>
   </p:notesMasterIdLst>
   <p:handoutMasterIdLst>
-    <p:handoutMasterId r:id="rId36"/>
+    <p:handoutMasterId r:id="rId45"/>
   </p:handoutMasterIdLst>
   <p:sldIdLst>
     <p:sldId id="261" r:id="rId2"/>
@@ -38,12 +38,21 @@
     <p:sldId id="288" r:id="rId26"/>
     <p:sldId id="294" r:id="rId27"/>
     <p:sldId id="289" r:id="rId28"/>
-    <p:sldId id="295" r:id="rId29"/>
-    <p:sldId id="296" r:id="rId30"/>
-    <p:sldId id="297" r:id="rId31"/>
-    <p:sldId id="269" r:id="rId32"/>
-    <p:sldId id="270" r:id="rId33"/>
-    <p:sldId id="276" r:id="rId34"/>
+    <p:sldId id="298" r:id="rId29"/>
+    <p:sldId id="295" r:id="rId30"/>
+    <p:sldId id="296" r:id="rId31"/>
+    <p:sldId id="305" r:id="rId32"/>
+    <p:sldId id="297" r:id="rId33"/>
+    <p:sldId id="306" r:id="rId34"/>
+    <p:sldId id="299" r:id="rId35"/>
+    <p:sldId id="300" r:id="rId36"/>
+    <p:sldId id="301" r:id="rId37"/>
+    <p:sldId id="302" r:id="rId38"/>
+    <p:sldId id="303" r:id="rId39"/>
+    <p:sldId id="304" r:id="rId40"/>
+    <p:sldId id="269" r:id="rId41"/>
+    <p:sldId id="270" r:id="rId42"/>
+    <p:sldId id="276" r:id="rId43"/>
   </p:sldIdLst>
   <p:sldSz cx="12192000" cy="6858000"/>
   <p:notesSz cx="6858000" cy="9144000"/>
@@ -16094,7 +16103,7 @@
           <a:p>
             <a:r>
               <a:rPr lang="en-US" dirty="0"/>
-              <a:t>Infrastructure: Determine the Current Tenant</a:t>
+              <a:t>Determine the Current Tenant</a:t>
             </a:r>
           </a:p>
         </p:txBody>
@@ -17647,7 +17656,7 @@
           <p:cNvPr id="2" name="Title 1">
             <a:extLst>
               <a:ext uri="{FF2B5EF4-FFF2-40B4-BE49-F238E27FC236}">
-                <a16:creationId xmlns:a16="http://schemas.microsoft.com/office/drawing/2014/main" id="{98AD1489-7F8E-47CF-B6DC-18F6B5F1873E}"/>
+                <a16:creationId xmlns:a16="http://schemas.microsoft.com/office/drawing/2014/main" id="{95752674-C9A2-4FCE-8B7D-10A54D1AC0B2}"/>
               </a:ext>
             </a:extLst>
           </p:cNvPr>
@@ -17660,42 +17669,53 @@
         </p:nvSpPr>
         <p:spPr/>
         <p:txBody>
-          <a:bodyPr/>
+          <a:bodyPr anchor="t"/>
           <a:lstStyle/>
           <a:p>
-            <a:endParaRPr lang="tr-TR"/>
+            <a:r>
+              <a:rPr lang="en-US" dirty="0"/>
+              <a:t>Multi-Tenancy Middleware Implementation</a:t>
+            </a:r>
+            <a:endParaRPr lang="tr-TR" dirty="0"/>
           </a:p>
         </p:txBody>
       </p:sp>
-      <p:sp>
-        <p:nvSpPr>
-          <p:cNvPr id="3" name="Content Placeholder 2">
+      <p:pic>
+        <p:nvPicPr>
+          <p:cNvPr id="4" name="Content Placeholder 3">
             <a:extLst>
               <a:ext uri="{FF2B5EF4-FFF2-40B4-BE49-F238E27FC236}">
-                <a16:creationId xmlns:a16="http://schemas.microsoft.com/office/drawing/2014/main" id="{EEFCF407-9159-4799-A0D7-713BF45CDB5D}"/>
+                <a16:creationId xmlns:a16="http://schemas.microsoft.com/office/drawing/2014/main" id="{498B2149-EA8D-49C3-A033-3BFC8F5260CF}"/>
               </a:ext>
             </a:extLst>
           </p:cNvPr>
-          <p:cNvSpPr>
-            <a:spLocks noGrp="1"/>
-          </p:cNvSpPr>
+          <p:cNvPicPr>
+            <a:picLocks noGrp="1" noChangeAspect="1"/>
+          </p:cNvPicPr>
           <p:nvPr>
             <p:ph idx="1"/>
           </p:nvPr>
-        </p:nvSpPr>
-        <p:spPr/>
-        <p:txBody>
-          <a:bodyPr/>
-          <a:lstStyle/>
-          <a:p>
-            <a:endParaRPr lang="tr-TR"/>
-          </a:p>
-        </p:txBody>
-      </p:sp>
+        </p:nvPicPr>
+        <p:blipFill>
+          <a:blip r:embed="rId2"/>
+          <a:stretch>
+            <a:fillRect/>
+          </a:stretch>
+        </p:blipFill>
+        <p:spPr>
+          <a:xfrm>
+            <a:off x="3258716" y="1075045"/>
+            <a:ext cx="5674567" cy="5404350"/>
+          </a:xfrm>
+          <a:prstGeom prst="rect">
+            <a:avLst/>
+          </a:prstGeom>
+        </p:spPr>
+      </p:pic>
     </p:spTree>
     <p:extLst>
       <p:ext uri="{BB962C8B-B14F-4D97-AF65-F5344CB8AC3E}">
-        <p14:creationId xmlns:p14="http://schemas.microsoft.com/office/powerpoint/2010/main" val="1014193435"/>
+        <p14:creationId xmlns:p14="http://schemas.microsoft.com/office/powerpoint/2010/main" val="3335138925"/>
       </p:ext>
     </p:extLst>
   </p:cSld>
@@ -17739,7 +17759,7 @@
           <p:cNvPr id="2" name="Title 1">
             <a:extLst>
               <a:ext uri="{FF2B5EF4-FFF2-40B4-BE49-F238E27FC236}">
-                <a16:creationId xmlns:a16="http://schemas.microsoft.com/office/drawing/2014/main" id="{A8E87594-8274-430A-9526-7D91EBAE4A90}"/>
+                <a16:creationId xmlns:a16="http://schemas.microsoft.com/office/drawing/2014/main" id="{98AD1489-7F8E-47CF-B6DC-18F6B5F1873E}"/>
               </a:ext>
             </a:extLst>
           </p:cNvPr>
@@ -17752,42 +17772,107 @@
         </p:nvSpPr>
         <p:spPr/>
         <p:txBody>
-          <a:bodyPr/>
+          <a:bodyPr anchor="t"/>
           <a:lstStyle/>
           <a:p>
-            <a:endParaRPr lang="tr-TR"/>
+            <a:r>
+              <a:rPr lang="en-US" dirty="0"/>
+              <a:t>UI Design to Select the Tenant</a:t>
+            </a:r>
+            <a:endParaRPr lang="tr-TR" dirty="0"/>
           </a:p>
         </p:txBody>
       </p:sp>
-      <p:sp>
-        <p:nvSpPr>
-          <p:cNvPr id="3" name="Content Placeholder 2">
+      <p:pic>
+        <p:nvPicPr>
+          <p:cNvPr id="6146" name="Picture 2" descr="login-screen.png">
             <a:extLst>
               <a:ext uri="{FF2B5EF4-FFF2-40B4-BE49-F238E27FC236}">
-                <a16:creationId xmlns:a16="http://schemas.microsoft.com/office/drawing/2014/main" id="{DECA2F4C-D44D-44D7-8B73-056245C90E29}"/>
+                <a16:creationId xmlns:a16="http://schemas.microsoft.com/office/drawing/2014/main" id="{9ECD844A-EF42-4DD0-9874-2FE754483839}"/>
               </a:ext>
             </a:extLst>
           </p:cNvPr>
-          <p:cNvSpPr>
-            <a:spLocks noGrp="1"/>
-          </p:cNvSpPr>
+          <p:cNvPicPr>
+            <a:picLocks noGrp="1" noChangeAspect="1" noChangeArrowheads="1"/>
+          </p:cNvPicPr>
           <p:nvPr>
             <p:ph idx="1"/>
           </p:nvPr>
-        </p:nvSpPr>
-        <p:spPr/>
-        <p:txBody>
-          <a:bodyPr/>
-          <a:lstStyle/>
-          <a:p>
-            <a:endParaRPr lang="tr-TR"/>
-          </a:p>
-        </p:txBody>
-      </p:sp>
+        </p:nvPicPr>
+        <p:blipFill>
+          <a:blip r:embed="rId2">
+            <a:extLst>
+              <a:ext uri="{28A0092B-C50C-407E-A947-70E740481C1C}">
+                <a14:useLocalDpi xmlns:a14="http://schemas.microsoft.com/office/drawing/2010/main" val="0"/>
+              </a:ext>
+            </a:extLst>
+          </a:blip>
+          <a:srcRect/>
+          <a:stretch>
+            <a:fillRect/>
+          </a:stretch>
+        </p:blipFill>
+        <p:spPr bwMode="auto">
+          <a:xfrm>
+            <a:off x="1295400" y="1646238"/>
+            <a:ext cx="3966449" cy="3810000"/>
+          </a:xfrm>
+          <a:prstGeom prst="rect">
+            <a:avLst/>
+          </a:prstGeom>
+          <a:noFill/>
+          <a:extLst>
+            <a:ext uri="{909E8E84-426E-40DD-AFC4-6F175D3DCCD1}">
+              <a14:hiddenFill xmlns:a14="http://schemas.microsoft.com/office/drawing/2010/main">
+                <a:solidFill>
+                  <a:srgbClr val="FFFFFF"/>
+                </a:solidFill>
+              </a14:hiddenFill>
+            </a:ext>
+          </a:extLst>
+        </p:spPr>
+      </p:pic>
+      <p:pic>
+        <p:nvPicPr>
+          <p:cNvPr id="4" name="Picture 3">
+            <a:extLst>
+              <a:ext uri="{FF2B5EF4-FFF2-40B4-BE49-F238E27FC236}">
+                <a16:creationId xmlns:a16="http://schemas.microsoft.com/office/drawing/2014/main" id="{D9417304-B1FF-41BE-96BF-055208FEE0F3}"/>
+              </a:ext>
+            </a:extLst>
+          </p:cNvPr>
+          <p:cNvPicPr>
+            <a:picLocks noChangeAspect="1"/>
+          </p:cNvPicPr>
+          <p:nvPr/>
+        </p:nvPicPr>
+        <p:blipFill>
+          <a:blip r:embed="rId3"/>
+          <a:stretch>
+            <a:fillRect/>
+          </a:stretch>
+        </p:blipFill>
+        <p:spPr>
+          <a:xfrm>
+            <a:off x="6630663" y="1075045"/>
+            <a:ext cx="3409512" cy="5008514"/>
+          </a:xfrm>
+          <a:prstGeom prst="rect">
+            <a:avLst/>
+          </a:prstGeom>
+          <a:ln>
+            <a:solidFill>
+              <a:schemeClr val="bg1">
+                <a:lumMod val="50000"/>
+              </a:schemeClr>
+            </a:solidFill>
+          </a:ln>
+        </p:spPr>
+      </p:pic>
     </p:spTree>
     <p:extLst>
       <p:ext uri="{BB962C8B-B14F-4D97-AF65-F5344CB8AC3E}">
-        <p14:creationId xmlns:p14="http://schemas.microsoft.com/office/powerpoint/2010/main" val="271060063"/>
+        <p14:creationId xmlns:p14="http://schemas.microsoft.com/office/powerpoint/2010/main" val="1014193435"/>
       </p:ext>
     </p:extLst>
   </p:cSld>
@@ -17992,7 +18077,7 @@
           <p:cNvPr id="2" name="Title 1">
             <a:extLst>
               <a:ext uri="{FF2B5EF4-FFF2-40B4-BE49-F238E27FC236}">
-                <a16:creationId xmlns:a16="http://schemas.microsoft.com/office/drawing/2014/main" id="{B225C1C4-AE2E-412F-B140-2E867D326509}"/>
+                <a16:creationId xmlns:a16="http://schemas.microsoft.com/office/drawing/2014/main" id="{A8E87594-8274-430A-9526-7D91EBAE4A90}"/>
               </a:ext>
             </a:extLst>
           </p:cNvPr>
@@ -18005,10 +18090,14 @@
         </p:nvSpPr>
         <p:spPr/>
         <p:txBody>
-          <a:bodyPr/>
+          <a:bodyPr anchor="b"/>
           <a:lstStyle/>
           <a:p>
-            <a:endParaRPr lang="tr-TR"/>
+            <a:r>
+              <a:rPr lang="en-US" dirty="0"/>
+              <a:t>Authentication Cookie/Token</a:t>
+            </a:r>
+            <a:endParaRPr lang="tr-TR" dirty="0"/>
           </a:p>
         </p:txBody>
       </p:sp>
@@ -18017,7 +18106,7 @@
           <p:cNvPr id="3" name="Content Placeholder 2">
             <a:extLst>
               <a:ext uri="{FF2B5EF4-FFF2-40B4-BE49-F238E27FC236}">
-                <a16:creationId xmlns:a16="http://schemas.microsoft.com/office/drawing/2014/main" id="{BF821C1A-D224-4AC1-84D3-CE27CE7180C3}"/>
+                <a16:creationId xmlns:a16="http://schemas.microsoft.com/office/drawing/2014/main" id="{DECA2F4C-D44D-44D7-8B73-056245C90E29}"/>
               </a:ext>
             </a:extLst>
           </p:cNvPr>
@@ -18033,14 +18122,25 @@
           <a:bodyPr/>
           <a:lstStyle/>
           <a:p>
-            <a:endParaRPr lang="tr-TR"/>
+            <a:r>
+              <a:rPr lang="en-US" dirty="0"/>
+              <a:t>Add </a:t>
+            </a:r>
+            <a:r>
+              <a:rPr lang="en-US" dirty="0" err="1"/>
+              <a:t>TenantId</a:t>
+            </a:r>
+            <a:r>
+              <a:rPr lang="en-US" dirty="0"/>
+              <a:t> to the authentication cookie on login.</a:t>
+            </a:r>
           </a:p>
         </p:txBody>
       </p:sp>
     </p:spTree>
     <p:extLst>
       <p:ext uri="{BB962C8B-B14F-4D97-AF65-F5344CB8AC3E}">
-        <p14:creationId xmlns:p14="http://schemas.microsoft.com/office/powerpoint/2010/main" val="150459125"/>
+        <p14:creationId xmlns:p14="http://schemas.microsoft.com/office/powerpoint/2010/main" val="271060063"/>
       </p:ext>
     </p:extLst>
   </p:cSld>
@@ -18081,7 +18181,13 @@
       </p:grpSpPr>
       <p:sp>
         <p:nvSpPr>
-          <p:cNvPr id="2" name="Title 1"/>
+          <p:cNvPr id="2" name="Title 1">
+            <a:extLst>
+              <a:ext uri="{FF2B5EF4-FFF2-40B4-BE49-F238E27FC236}">
+                <a16:creationId xmlns:a16="http://schemas.microsoft.com/office/drawing/2014/main" id="{5B675848-0667-4F7B-998D-AC4FDB9E351B}"/>
+              </a:ext>
+            </a:extLst>
+          </p:cNvPr>
           <p:cNvSpPr>
             <a:spLocks noGrp="1"/>
           </p:cNvSpPr>
@@ -18096,19 +18202,26 @@
           <a:p>
             <a:r>
               <a:rPr lang="en-US" dirty="0"/>
-              <a:t>Add a Slide Title - 4</a:t>
-            </a:r>
+              <a:t>Multi-Tenancy</a:t>
+            </a:r>
+            <a:endParaRPr lang="tr-TR" dirty="0"/>
           </a:p>
         </p:txBody>
       </p:sp>
       <p:sp>
         <p:nvSpPr>
-          <p:cNvPr id="5" name="Content Placeholder 4"/>
+          <p:cNvPr id="3" name="Text Placeholder 2">
+            <a:extLst>
+              <a:ext uri="{FF2B5EF4-FFF2-40B4-BE49-F238E27FC236}">
+                <a16:creationId xmlns:a16="http://schemas.microsoft.com/office/drawing/2014/main" id="{9A964DF7-C484-45B1-B6AD-DBF9611DB367}"/>
+              </a:ext>
+            </a:extLst>
+          </p:cNvPr>
           <p:cNvSpPr>
             <a:spLocks noGrp="1"/>
           </p:cNvSpPr>
           <p:nvPr>
-            <p:ph idx="1"/>
+            <p:ph type="body" idx="1"/>
           </p:nvPr>
         </p:nvSpPr>
         <p:spPr/>
@@ -18116,33 +18229,18 @@
           <a:bodyPr/>
           <a:lstStyle/>
           <a:p>
-            <a:endParaRPr lang="en-US"/>
-          </a:p>
-        </p:txBody>
-      </p:sp>
-      <p:sp>
-        <p:nvSpPr>
-          <p:cNvPr id="6" name="Text Placeholder 5"/>
-          <p:cNvSpPr>
-            <a:spLocks noGrp="1"/>
-          </p:cNvSpPr>
-          <p:nvPr>
-            <p:ph type="body" sz="half" idx="2"/>
-          </p:nvPr>
-        </p:nvSpPr>
-        <p:spPr/>
-        <p:txBody>
-          <a:bodyPr/>
-          <a:lstStyle/>
-          <a:p>
-            <a:endParaRPr lang="en-US"/>
+            <a:r>
+              <a:rPr lang="en-US" dirty="0"/>
+              <a:t>Database / Data Isolation</a:t>
+            </a:r>
+            <a:endParaRPr lang="tr-TR" dirty="0"/>
           </a:p>
         </p:txBody>
       </p:sp>
     </p:spTree>
     <p:extLst>
       <p:ext uri="{BB962C8B-B14F-4D97-AF65-F5344CB8AC3E}">
-        <p14:creationId xmlns:p14="http://schemas.microsoft.com/office/powerpoint/2010/main" val="4101607575"/>
+        <p14:creationId xmlns:p14="http://schemas.microsoft.com/office/powerpoint/2010/main" val="3133479184"/>
       </p:ext>
     </p:extLst>
   </p:cSld>
@@ -18183,7 +18281,13 @@
       </p:grpSpPr>
       <p:sp>
         <p:nvSpPr>
-          <p:cNvPr id="3" name="Title 2"/>
+          <p:cNvPr id="2" name="Title 1">
+            <a:extLst>
+              <a:ext uri="{FF2B5EF4-FFF2-40B4-BE49-F238E27FC236}">
+                <a16:creationId xmlns:a16="http://schemas.microsoft.com/office/drawing/2014/main" id="{B225C1C4-AE2E-412F-B140-2E867D326509}"/>
+              </a:ext>
+            </a:extLst>
+          </p:cNvPr>
           <p:cNvSpPr>
             <a:spLocks noGrp="1"/>
           </p:cNvSpPr>
@@ -18193,51 +18297,83 @@
         </p:nvSpPr>
         <p:spPr/>
         <p:txBody>
-          <a:bodyPr/>
+          <a:bodyPr anchor="t"/>
           <a:lstStyle/>
           <a:p>
             <a:r>
               <a:rPr lang="en-US" dirty="0"/>
-              <a:t>Add a Slide Title - 5</a:t>
-            </a:r>
+              <a:t>Dynamically Select the Connection String</a:t>
+            </a:r>
+            <a:endParaRPr lang="tr-TR" dirty="0"/>
           </a:p>
         </p:txBody>
       </p:sp>
-      <p:sp>
-        <p:nvSpPr>
-          <p:cNvPr id="5" name="Picture Placeholder 4"/>
-          <p:cNvSpPr>
-            <a:spLocks noGrp="1"/>
-          </p:cNvSpPr>
+      <p:pic>
+        <p:nvPicPr>
+          <p:cNvPr id="5" name="Content Placeholder 4">
+            <a:extLst>
+              <a:ext uri="{FF2B5EF4-FFF2-40B4-BE49-F238E27FC236}">
+                <a16:creationId xmlns:a16="http://schemas.microsoft.com/office/drawing/2014/main" id="{29859432-5B99-4655-AC0D-3583AC3D5DD3}"/>
+              </a:ext>
+            </a:extLst>
+          </p:cNvPr>
+          <p:cNvPicPr>
+            <a:picLocks noGrp="1" noChangeAspect="1"/>
+          </p:cNvPicPr>
           <p:nvPr>
-            <p:ph type="pic" idx="1"/>
+            <p:ph idx="1"/>
           </p:nvPr>
-        </p:nvSpPr>
-        <p:spPr/>
-      </p:sp>
-      <p:sp>
-        <p:nvSpPr>
-          <p:cNvPr id="6" name="Text Placeholder 5"/>
-          <p:cNvSpPr>
-            <a:spLocks noGrp="1"/>
-          </p:cNvSpPr>
-          <p:nvPr>
-            <p:ph type="body" sz="half" idx="2"/>
-          </p:nvPr>
-        </p:nvSpPr>
-        <p:spPr/>
-        <p:txBody>
-          <a:bodyPr/>
-          <a:lstStyle/>
-          <a:p>
-            <a:endParaRPr lang="en-US"/>
-          </a:p>
-        </p:txBody>
-      </p:sp>
+        </p:nvPicPr>
+        <p:blipFill>
+          <a:blip r:embed="rId2"/>
+          <a:stretch>
+            <a:fillRect/>
+          </a:stretch>
+        </p:blipFill>
+        <p:spPr>
+          <a:xfrm>
+            <a:off x="1295400" y="1126445"/>
+            <a:ext cx="7996688" cy="1142384"/>
+          </a:xfrm>
+          <a:prstGeom prst="rect">
+            <a:avLst/>
+          </a:prstGeom>
+        </p:spPr>
+      </p:pic>
+      <p:pic>
+        <p:nvPicPr>
+          <p:cNvPr id="8" name="Picture 7">
+            <a:extLst>
+              <a:ext uri="{FF2B5EF4-FFF2-40B4-BE49-F238E27FC236}">
+                <a16:creationId xmlns:a16="http://schemas.microsoft.com/office/drawing/2014/main" id="{3BE1260B-DA81-4C1A-ADA9-C18250E7D97C}"/>
+              </a:ext>
+            </a:extLst>
+          </p:cNvPr>
+          <p:cNvPicPr>
+            <a:picLocks noChangeAspect="1"/>
+          </p:cNvPicPr>
+          <p:nvPr/>
+        </p:nvPicPr>
+        <p:blipFill>
+          <a:blip r:embed="rId3"/>
+          <a:stretch>
+            <a:fillRect/>
+          </a:stretch>
+        </p:blipFill>
+        <p:spPr>
+          <a:xfrm>
+            <a:off x="2762250" y="2119895"/>
+            <a:ext cx="8134350" cy="4391025"/>
+          </a:xfrm>
+          <a:prstGeom prst="rect">
+            <a:avLst/>
+          </a:prstGeom>
+        </p:spPr>
+      </p:pic>
     </p:spTree>
     <p:extLst>
       <p:ext uri="{BB962C8B-B14F-4D97-AF65-F5344CB8AC3E}">
-        <p14:creationId xmlns:p14="http://schemas.microsoft.com/office/powerpoint/2010/main" val="2794409471"/>
+        <p14:creationId xmlns:p14="http://schemas.microsoft.com/office/powerpoint/2010/main" val="150459125"/>
       </p:ext>
     </p:extLst>
   </p:cSld>
@@ -18281,7 +18417,110 @@
           <p:cNvPr id="2" name="Title 1">
             <a:extLst>
               <a:ext uri="{FF2B5EF4-FFF2-40B4-BE49-F238E27FC236}">
-                <a16:creationId xmlns:a16="http://schemas.microsoft.com/office/drawing/2014/main" id="{700032AE-86CF-4383-933C-9021A37A6D8F}"/>
+                <a16:creationId xmlns:a16="http://schemas.microsoft.com/office/drawing/2014/main" id="{1280342D-5EE9-4ED2-B070-C3AA31818BB1}"/>
+              </a:ext>
+            </a:extLst>
+          </p:cNvPr>
+          <p:cNvSpPr>
+            <a:spLocks noGrp="1"/>
+          </p:cNvSpPr>
+          <p:nvPr>
+            <p:ph type="title"/>
+          </p:nvPr>
+        </p:nvSpPr>
+        <p:spPr/>
+        <p:txBody>
+          <a:bodyPr anchor="t"/>
+          <a:lstStyle/>
+          <a:p>
+            <a:r>
+              <a:rPr lang="en-US" dirty="0"/>
+              <a:t>Dynamically Select the Connection String</a:t>
+            </a:r>
+            <a:endParaRPr lang="tr-TR" dirty="0"/>
+          </a:p>
+        </p:txBody>
+      </p:sp>
+      <p:pic>
+        <p:nvPicPr>
+          <p:cNvPr id="8" name="Content Placeholder 7">
+            <a:extLst>
+              <a:ext uri="{FF2B5EF4-FFF2-40B4-BE49-F238E27FC236}">
+                <a16:creationId xmlns:a16="http://schemas.microsoft.com/office/drawing/2014/main" id="{70C4B45D-A9D0-45D7-A16A-B9B5500730E0}"/>
+              </a:ext>
+            </a:extLst>
+          </p:cNvPr>
+          <p:cNvPicPr>
+            <a:picLocks noGrp="1" noChangeAspect="1"/>
+          </p:cNvPicPr>
+          <p:nvPr>
+            <p:ph idx="1"/>
+          </p:nvPr>
+        </p:nvPicPr>
+        <p:blipFill>
+          <a:blip r:embed="rId2"/>
+          <a:stretch>
+            <a:fillRect/>
+          </a:stretch>
+        </p:blipFill>
+        <p:spPr>
+          <a:xfrm>
+            <a:off x="591471" y="1646238"/>
+            <a:ext cx="11009058" cy="3830703"/>
+          </a:xfrm>
+          <a:prstGeom prst="rect">
+            <a:avLst/>
+          </a:prstGeom>
+        </p:spPr>
+      </p:pic>
+    </p:spTree>
+    <p:extLst>
+      <p:ext uri="{BB962C8B-B14F-4D97-AF65-F5344CB8AC3E}">
+        <p14:creationId xmlns:p14="http://schemas.microsoft.com/office/powerpoint/2010/main" val="1865231919"/>
+      </p:ext>
+    </p:extLst>
+  </p:cSld>
+  <p:clrMapOvr>
+    <a:masterClrMapping/>
+  </p:clrMapOvr>
+  <mc:AlternateContent xmlns:mc="http://schemas.openxmlformats.org/markup-compatibility/2006" xmlns:p14="http://schemas.microsoft.com/office/powerpoint/2010/main">
+    <mc:Choice Requires="p14">
+      <p:transition spd="med" p14:dur="700">
+        <p:fade/>
+      </p:transition>
+    </mc:Choice>
+    <mc:Fallback xmlns="">
+      <p:transition spd="med">
+        <p:fade/>
+      </p:transition>
+    </mc:Fallback>
+  </mc:AlternateContent>
+</p:sld>
+</file>
+
+<file path=ppt/slides/slide34.xml><?xml version="1.0" encoding="utf-8"?>
+<p:sld xmlns:a="http://schemas.openxmlformats.org/drawingml/2006/main" xmlns:r="http://schemas.openxmlformats.org/officeDocument/2006/relationships" xmlns:p="http://schemas.openxmlformats.org/presentationml/2006/main">
+  <p:cSld>
+    <p:spTree>
+      <p:nvGrpSpPr>
+        <p:cNvPr id="1" name=""/>
+        <p:cNvGrpSpPr/>
+        <p:nvPr/>
+      </p:nvGrpSpPr>
+      <p:grpSpPr>
+        <a:xfrm>
+          <a:off x="0" y="0"/>
+          <a:ext cx="0" cy="0"/>
+          <a:chOff x="0" y="0"/>
+          <a:chExt cx="0" cy="0"/>
+        </a:xfrm>
+      </p:grpSpPr>
+      <p:sp>
+        <p:nvSpPr>
+          <p:cNvPr id="2" name="Title 1">
+            <a:extLst>
+              <a:ext uri="{FF2B5EF4-FFF2-40B4-BE49-F238E27FC236}">
+                <a16:creationId xmlns:a16="http://schemas.microsoft.com/office/drawing/2014/main" id="{22626C53-E88A-4383-B517-205E57084002}"/>
               </a:ext>
             </a:extLst>
           </p:cNvPr>
@@ -18306,7 +18545,7 @@
           <p:cNvPr id="3" name="Content Placeholder 2">
             <a:extLst>
               <a:ext uri="{FF2B5EF4-FFF2-40B4-BE49-F238E27FC236}">
-                <a16:creationId xmlns:a16="http://schemas.microsoft.com/office/drawing/2014/main" id="{7881CEEF-206D-46CC-A023-F63C0FD584C5}"/>
+                <a16:creationId xmlns:a16="http://schemas.microsoft.com/office/drawing/2014/main" id="{9D4E2445-8828-4083-A1D1-CFDE9CFD4A98}"/>
               </a:ext>
             </a:extLst>
           </p:cNvPr>
@@ -18329,7 +18568,467 @@
     </p:spTree>
     <p:extLst>
       <p:ext uri="{BB962C8B-B14F-4D97-AF65-F5344CB8AC3E}">
-        <p14:creationId xmlns:p14="http://schemas.microsoft.com/office/powerpoint/2010/main" val="4093661547"/>
+        <p14:creationId xmlns:p14="http://schemas.microsoft.com/office/powerpoint/2010/main" val="309005214"/>
+      </p:ext>
+    </p:extLst>
+  </p:cSld>
+  <p:clrMapOvr>
+    <a:masterClrMapping/>
+  </p:clrMapOvr>
+  <mc:AlternateContent xmlns:mc="http://schemas.openxmlformats.org/markup-compatibility/2006" xmlns:p14="http://schemas.microsoft.com/office/powerpoint/2010/main">
+    <mc:Choice Requires="p14">
+      <p:transition spd="med" p14:dur="700">
+        <p:fade/>
+      </p:transition>
+    </mc:Choice>
+    <mc:Fallback xmlns="">
+      <p:transition spd="med">
+        <p:fade/>
+      </p:transition>
+    </mc:Fallback>
+  </mc:AlternateContent>
+</p:sld>
+</file>
+
+<file path=ppt/slides/slide35.xml><?xml version="1.0" encoding="utf-8"?>
+<p:sld xmlns:a="http://schemas.openxmlformats.org/drawingml/2006/main" xmlns:r="http://schemas.openxmlformats.org/officeDocument/2006/relationships" xmlns:p="http://schemas.openxmlformats.org/presentationml/2006/main">
+  <p:cSld>
+    <p:spTree>
+      <p:nvGrpSpPr>
+        <p:cNvPr id="1" name=""/>
+        <p:cNvGrpSpPr/>
+        <p:nvPr/>
+      </p:nvGrpSpPr>
+      <p:grpSpPr>
+        <a:xfrm>
+          <a:off x="0" y="0"/>
+          <a:ext cx="0" cy="0"/>
+          <a:chOff x="0" y="0"/>
+          <a:chExt cx="0" cy="0"/>
+        </a:xfrm>
+      </p:grpSpPr>
+      <p:sp>
+        <p:nvSpPr>
+          <p:cNvPr id="2" name="Title 1">
+            <a:extLst>
+              <a:ext uri="{FF2B5EF4-FFF2-40B4-BE49-F238E27FC236}">
+                <a16:creationId xmlns:a16="http://schemas.microsoft.com/office/drawing/2014/main" id="{BA69C879-0ECF-40EC-BF55-15FD73199388}"/>
+              </a:ext>
+            </a:extLst>
+          </p:cNvPr>
+          <p:cNvSpPr>
+            <a:spLocks noGrp="1"/>
+          </p:cNvSpPr>
+          <p:nvPr>
+            <p:ph type="title"/>
+          </p:nvPr>
+        </p:nvSpPr>
+        <p:spPr/>
+        <p:txBody>
+          <a:bodyPr/>
+          <a:lstStyle/>
+          <a:p>
+            <a:endParaRPr lang="tr-TR"/>
+          </a:p>
+        </p:txBody>
+      </p:sp>
+      <p:sp>
+        <p:nvSpPr>
+          <p:cNvPr id="3" name="Content Placeholder 2">
+            <a:extLst>
+              <a:ext uri="{FF2B5EF4-FFF2-40B4-BE49-F238E27FC236}">
+                <a16:creationId xmlns:a16="http://schemas.microsoft.com/office/drawing/2014/main" id="{62269AEB-2E27-4533-8CB7-632430FB7324}"/>
+              </a:ext>
+            </a:extLst>
+          </p:cNvPr>
+          <p:cNvSpPr>
+            <a:spLocks noGrp="1"/>
+          </p:cNvSpPr>
+          <p:nvPr>
+            <p:ph idx="1"/>
+          </p:nvPr>
+        </p:nvSpPr>
+        <p:spPr/>
+        <p:txBody>
+          <a:bodyPr/>
+          <a:lstStyle/>
+          <a:p>
+            <a:endParaRPr lang="tr-TR"/>
+          </a:p>
+        </p:txBody>
+      </p:sp>
+    </p:spTree>
+    <p:extLst>
+      <p:ext uri="{BB962C8B-B14F-4D97-AF65-F5344CB8AC3E}">
+        <p14:creationId xmlns:p14="http://schemas.microsoft.com/office/powerpoint/2010/main" val="460580387"/>
+      </p:ext>
+    </p:extLst>
+  </p:cSld>
+  <p:clrMapOvr>
+    <a:masterClrMapping/>
+  </p:clrMapOvr>
+  <mc:AlternateContent xmlns:mc="http://schemas.openxmlformats.org/markup-compatibility/2006" xmlns:p14="http://schemas.microsoft.com/office/powerpoint/2010/main">
+    <mc:Choice Requires="p14">
+      <p:transition spd="med" p14:dur="700">
+        <p:fade/>
+      </p:transition>
+    </mc:Choice>
+    <mc:Fallback xmlns="">
+      <p:transition spd="med">
+        <p:fade/>
+      </p:transition>
+    </mc:Fallback>
+  </mc:AlternateContent>
+</p:sld>
+</file>
+
+<file path=ppt/slides/slide36.xml><?xml version="1.0" encoding="utf-8"?>
+<p:sld xmlns:a="http://schemas.openxmlformats.org/drawingml/2006/main" xmlns:r="http://schemas.openxmlformats.org/officeDocument/2006/relationships" xmlns:p="http://schemas.openxmlformats.org/presentationml/2006/main">
+  <p:cSld>
+    <p:spTree>
+      <p:nvGrpSpPr>
+        <p:cNvPr id="1" name=""/>
+        <p:cNvGrpSpPr/>
+        <p:nvPr/>
+      </p:nvGrpSpPr>
+      <p:grpSpPr>
+        <a:xfrm>
+          <a:off x="0" y="0"/>
+          <a:ext cx="0" cy="0"/>
+          <a:chOff x="0" y="0"/>
+          <a:chExt cx="0" cy="0"/>
+        </a:xfrm>
+      </p:grpSpPr>
+      <p:sp>
+        <p:nvSpPr>
+          <p:cNvPr id="2" name="Title 1">
+            <a:extLst>
+              <a:ext uri="{FF2B5EF4-FFF2-40B4-BE49-F238E27FC236}">
+                <a16:creationId xmlns:a16="http://schemas.microsoft.com/office/drawing/2014/main" id="{5FEFC4AE-3FC4-4289-AA1F-D610EF4F67C6}"/>
+              </a:ext>
+            </a:extLst>
+          </p:cNvPr>
+          <p:cNvSpPr>
+            <a:spLocks noGrp="1"/>
+          </p:cNvSpPr>
+          <p:nvPr>
+            <p:ph type="title"/>
+          </p:nvPr>
+        </p:nvSpPr>
+        <p:spPr/>
+        <p:txBody>
+          <a:bodyPr/>
+          <a:lstStyle/>
+          <a:p>
+            <a:endParaRPr lang="tr-TR"/>
+          </a:p>
+        </p:txBody>
+      </p:sp>
+      <p:sp>
+        <p:nvSpPr>
+          <p:cNvPr id="3" name="Content Placeholder 2">
+            <a:extLst>
+              <a:ext uri="{FF2B5EF4-FFF2-40B4-BE49-F238E27FC236}">
+                <a16:creationId xmlns:a16="http://schemas.microsoft.com/office/drawing/2014/main" id="{4AD6B52A-4C1B-4918-A39C-305D9B88CBFC}"/>
+              </a:ext>
+            </a:extLst>
+          </p:cNvPr>
+          <p:cNvSpPr>
+            <a:spLocks noGrp="1"/>
+          </p:cNvSpPr>
+          <p:nvPr>
+            <p:ph idx="1"/>
+          </p:nvPr>
+        </p:nvSpPr>
+        <p:spPr/>
+        <p:txBody>
+          <a:bodyPr/>
+          <a:lstStyle/>
+          <a:p>
+            <a:endParaRPr lang="tr-TR"/>
+          </a:p>
+        </p:txBody>
+      </p:sp>
+    </p:spTree>
+    <p:extLst>
+      <p:ext uri="{BB962C8B-B14F-4D97-AF65-F5344CB8AC3E}">
+        <p14:creationId xmlns:p14="http://schemas.microsoft.com/office/powerpoint/2010/main" val="796750104"/>
+      </p:ext>
+    </p:extLst>
+  </p:cSld>
+  <p:clrMapOvr>
+    <a:masterClrMapping/>
+  </p:clrMapOvr>
+  <mc:AlternateContent xmlns:mc="http://schemas.openxmlformats.org/markup-compatibility/2006" xmlns:p14="http://schemas.microsoft.com/office/powerpoint/2010/main">
+    <mc:Choice Requires="p14">
+      <p:transition spd="med" p14:dur="700">
+        <p:fade/>
+      </p:transition>
+    </mc:Choice>
+    <mc:Fallback xmlns="">
+      <p:transition spd="med">
+        <p:fade/>
+      </p:transition>
+    </mc:Fallback>
+  </mc:AlternateContent>
+</p:sld>
+</file>
+
+<file path=ppt/slides/slide37.xml><?xml version="1.0" encoding="utf-8"?>
+<p:sld xmlns:a="http://schemas.openxmlformats.org/drawingml/2006/main" xmlns:r="http://schemas.openxmlformats.org/officeDocument/2006/relationships" xmlns:p="http://schemas.openxmlformats.org/presentationml/2006/main">
+  <p:cSld>
+    <p:spTree>
+      <p:nvGrpSpPr>
+        <p:cNvPr id="1" name=""/>
+        <p:cNvGrpSpPr/>
+        <p:nvPr/>
+      </p:nvGrpSpPr>
+      <p:grpSpPr>
+        <a:xfrm>
+          <a:off x="0" y="0"/>
+          <a:ext cx="0" cy="0"/>
+          <a:chOff x="0" y="0"/>
+          <a:chExt cx="0" cy="0"/>
+        </a:xfrm>
+      </p:grpSpPr>
+      <p:sp>
+        <p:nvSpPr>
+          <p:cNvPr id="2" name="Title 1">
+            <a:extLst>
+              <a:ext uri="{FF2B5EF4-FFF2-40B4-BE49-F238E27FC236}">
+                <a16:creationId xmlns:a16="http://schemas.microsoft.com/office/drawing/2014/main" id="{A9A6F59D-36A9-45E9-BC69-ED35D015E9A5}"/>
+              </a:ext>
+            </a:extLst>
+          </p:cNvPr>
+          <p:cNvSpPr>
+            <a:spLocks noGrp="1"/>
+          </p:cNvSpPr>
+          <p:nvPr>
+            <p:ph type="title"/>
+          </p:nvPr>
+        </p:nvSpPr>
+        <p:spPr/>
+        <p:txBody>
+          <a:bodyPr/>
+          <a:lstStyle/>
+          <a:p>
+            <a:endParaRPr lang="tr-TR"/>
+          </a:p>
+        </p:txBody>
+      </p:sp>
+      <p:sp>
+        <p:nvSpPr>
+          <p:cNvPr id="3" name="Content Placeholder 2">
+            <a:extLst>
+              <a:ext uri="{FF2B5EF4-FFF2-40B4-BE49-F238E27FC236}">
+                <a16:creationId xmlns:a16="http://schemas.microsoft.com/office/drawing/2014/main" id="{59E0AFFB-784C-4758-90DE-A1901A81D6DB}"/>
+              </a:ext>
+            </a:extLst>
+          </p:cNvPr>
+          <p:cNvSpPr>
+            <a:spLocks noGrp="1"/>
+          </p:cNvSpPr>
+          <p:nvPr>
+            <p:ph idx="1"/>
+          </p:nvPr>
+        </p:nvSpPr>
+        <p:spPr/>
+        <p:txBody>
+          <a:bodyPr/>
+          <a:lstStyle/>
+          <a:p>
+            <a:endParaRPr lang="tr-TR"/>
+          </a:p>
+        </p:txBody>
+      </p:sp>
+    </p:spTree>
+    <p:extLst>
+      <p:ext uri="{BB962C8B-B14F-4D97-AF65-F5344CB8AC3E}">
+        <p14:creationId xmlns:p14="http://schemas.microsoft.com/office/powerpoint/2010/main" val="2762832503"/>
+      </p:ext>
+    </p:extLst>
+  </p:cSld>
+  <p:clrMapOvr>
+    <a:masterClrMapping/>
+  </p:clrMapOvr>
+  <mc:AlternateContent xmlns:mc="http://schemas.openxmlformats.org/markup-compatibility/2006" xmlns:p14="http://schemas.microsoft.com/office/powerpoint/2010/main">
+    <mc:Choice Requires="p14">
+      <p:transition spd="med" p14:dur="700">
+        <p:fade/>
+      </p:transition>
+    </mc:Choice>
+    <mc:Fallback xmlns="">
+      <p:transition spd="med">
+        <p:fade/>
+      </p:transition>
+    </mc:Fallback>
+  </mc:AlternateContent>
+</p:sld>
+</file>
+
+<file path=ppt/slides/slide38.xml><?xml version="1.0" encoding="utf-8"?>
+<p:sld xmlns:a="http://schemas.openxmlformats.org/drawingml/2006/main" xmlns:r="http://schemas.openxmlformats.org/officeDocument/2006/relationships" xmlns:p="http://schemas.openxmlformats.org/presentationml/2006/main">
+  <p:cSld>
+    <p:spTree>
+      <p:nvGrpSpPr>
+        <p:cNvPr id="1" name=""/>
+        <p:cNvGrpSpPr/>
+        <p:nvPr/>
+      </p:nvGrpSpPr>
+      <p:grpSpPr>
+        <a:xfrm>
+          <a:off x="0" y="0"/>
+          <a:ext cx="0" cy="0"/>
+          <a:chOff x="0" y="0"/>
+          <a:chExt cx="0" cy="0"/>
+        </a:xfrm>
+      </p:grpSpPr>
+      <p:sp>
+        <p:nvSpPr>
+          <p:cNvPr id="2" name="Title 1">
+            <a:extLst>
+              <a:ext uri="{FF2B5EF4-FFF2-40B4-BE49-F238E27FC236}">
+                <a16:creationId xmlns:a16="http://schemas.microsoft.com/office/drawing/2014/main" id="{8EE61433-5C7D-48F5-B4A5-F1FCDFDCAB30}"/>
+              </a:ext>
+            </a:extLst>
+          </p:cNvPr>
+          <p:cNvSpPr>
+            <a:spLocks noGrp="1"/>
+          </p:cNvSpPr>
+          <p:nvPr>
+            <p:ph type="title"/>
+          </p:nvPr>
+        </p:nvSpPr>
+        <p:spPr/>
+        <p:txBody>
+          <a:bodyPr/>
+          <a:lstStyle/>
+          <a:p>
+            <a:endParaRPr lang="tr-TR"/>
+          </a:p>
+        </p:txBody>
+      </p:sp>
+      <p:sp>
+        <p:nvSpPr>
+          <p:cNvPr id="3" name="Content Placeholder 2">
+            <a:extLst>
+              <a:ext uri="{FF2B5EF4-FFF2-40B4-BE49-F238E27FC236}">
+                <a16:creationId xmlns:a16="http://schemas.microsoft.com/office/drawing/2014/main" id="{DC494CA9-E423-449E-A122-E261F79B6256}"/>
+              </a:ext>
+            </a:extLst>
+          </p:cNvPr>
+          <p:cNvSpPr>
+            <a:spLocks noGrp="1"/>
+          </p:cNvSpPr>
+          <p:nvPr>
+            <p:ph idx="1"/>
+          </p:nvPr>
+        </p:nvSpPr>
+        <p:spPr/>
+        <p:txBody>
+          <a:bodyPr/>
+          <a:lstStyle/>
+          <a:p>
+            <a:endParaRPr lang="tr-TR"/>
+          </a:p>
+        </p:txBody>
+      </p:sp>
+    </p:spTree>
+    <p:extLst>
+      <p:ext uri="{BB962C8B-B14F-4D97-AF65-F5344CB8AC3E}">
+        <p14:creationId xmlns:p14="http://schemas.microsoft.com/office/powerpoint/2010/main" val="2129580115"/>
+      </p:ext>
+    </p:extLst>
+  </p:cSld>
+  <p:clrMapOvr>
+    <a:masterClrMapping/>
+  </p:clrMapOvr>
+  <mc:AlternateContent xmlns:mc="http://schemas.openxmlformats.org/markup-compatibility/2006" xmlns:p14="http://schemas.microsoft.com/office/powerpoint/2010/main">
+    <mc:Choice Requires="p14">
+      <p:transition spd="med" p14:dur="700">
+        <p:fade/>
+      </p:transition>
+    </mc:Choice>
+    <mc:Fallback xmlns="">
+      <p:transition spd="med">
+        <p:fade/>
+      </p:transition>
+    </mc:Fallback>
+  </mc:AlternateContent>
+</p:sld>
+</file>
+
+<file path=ppt/slides/slide39.xml><?xml version="1.0" encoding="utf-8"?>
+<p:sld xmlns:a="http://schemas.openxmlformats.org/drawingml/2006/main" xmlns:r="http://schemas.openxmlformats.org/officeDocument/2006/relationships" xmlns:p="http://schemas.openxmlformats.org/presentationml/2006/main">
+  <p:cSld>
+    <p:spTree>
+      <p:nvGrpSpPr>
+        <p:cNvPr id="1" name=""/>
+        <p:cNvGrpSpPr/>
+        <p:nvPr/>
+      </p:nvGrpSpPr>
+      <p:grpSpPr>
+        <a:xfrm>
+          <a:off x="0" y="0"/>
+          <a:ext cx="0" cy="0"/>
+          <a:chOff x="0" y="0"/>
+          <a:chExt cx="0" cy="0"/>
+        </a:xfrm>
+      </p:grpSpPr>
+      <p:sp>
+        <p:nvSpPr>
+          <p:cNvPr id="2" name="Title 1">
+            <a:extLst>
+              <a:ext uri="{FF2B5EF4-FFF2-40B4-BE49-F238E27FC236}">
+                <a16:creationId xmlns:a16="http://schemas.microsoft.com/office/drawing/2014/main" id="{CB41140D-AF0A-4ABF-B782-A8D1CEC64CBE}"/>
+              </a:ext>
+            </a:extLst>
+          </p:cNvPr>
+          <p:cNvSpPr>
+            <a:spLocks noGrp="1"/>
+          </p:cNvSpPr>
+          <p:nvPr>
+            <p:ph type="title"/>
+          </p:nvPr>
+        </p:nvSpPr>
+        <p:spPr/>
+        <p:txBody>
+          <a:bodyPr/>
+          <a:lstStyle/>
+          <a:p>
+            <a:endParaRPr lang="tr-TR"/>
+          </a:p>
+        </p:txBody>
+      </p:sp>
+      <p:sp>
+        <p:nvSpPr>
+          <p:cNvPr id="3" name="Content Placeholder 2">
+            <a:extLst>
+              <a:ext uri="{FF2B5EF4-FFF2-40B4-BE49-F238E27FC236}">
+                <a16:creationId xmlns:a16="http://schemas.microsoft.com/office/drawing/2014/main" id="{74B0BF42-3029-4FF7-9655-6F9EB0C64B17}"/>
+              </a:ext>
+            </a:extLst>
+          </p:cNvPr>
+          <p:cNvSpPr>
+            <a:spLocks noGrp="1"/>
+          </p:cNvSpPr>
+          <p:nvPr>
+            <p:ph idx="1"/>
+          </p:nvPr>
+        </p:nvSpPr>
+        <p:spPr/>
+        <p:txBody>
+          <a:bodyPr/>
+          <a:lstStyle/>
+          <a:p>
+            <a:endParaRPr lang="tr-TR"/>
+          </a:p>
+        </p:txBody>
+      </p:sp>
+    </p:spTree>
+    <p:extLst>
+      <p:ext uri="{BB962C8B-B14F-4D97-AF65-F5344CB8AC3E}">
+        <p14:creationId xmlns:p14="http://schemas.microsoft.com/office/powerpoint/2010/main" val="2560340977"/>
       </p:ext>
     </p:extLst>
   </p:cSld>
@@ -18596,6 +19295,295 @@
     <p:extLst>
       <p:ext uri="{BB962C8B-B14F-4D97-AF65-F5344CB8AC3E}">
         <p14:creationId xmlns:p14="http://schemas.microsoft.com/office/powerpoint/2010/main" val="1476019738"/>
+      </p:ext>
+    </p:extLst>
+  </p:cSld>
+  <p:clrMapOvr>
+    <a:masterClrMapping/>
+  </p:clrMapOvr>
+  <mc:AlternateContent xmlns:mc="http://schemas.openxmlformats.org/markup-compatibility/2006" xmlns:p14="http://schemas.microsoft.com/office/powerpoint/2010/main">
+    <mc:Choice Requires="p14">
+      <p:transition spd="med" p14:dur="700">
+        <p:fade/>
+      </p:transition>
+    </mc:Choice>
+    <mc:Fallback xmlns="">
+      <p:transition spd="med">
+        <p:fade/>
+      </p:transition>
+    </mc:Fallback>
+  </mc:AlternateContent>
+</p:sld>
+</file>
+
+<file path=ppt/slides/slide40.xml><?xml version="1.0" encoding="utf-8"?>
+<p:sld xmlns:a="http://schemas.openxmlformats.org/drawingml/2006/main" xmlns:r="http://schemas.openxmlformats.org/officeDocument/2006/relationships" xmlns:p="http://schemas.openxmlformats.org/presentationml/2006/main">
+  <p:cSld>
+    <p:spTree>
+      <p:nvGrpSpPr>
+        <p:cNvPr id="1" name=""/>
+        <p:cNvGrpSpPr/>
+        <p:nvPr/>
+      </p:nvGrpSpPr>
+      <p:grpSpPr>
+        <a:xfrm>
+          <a:off x="0" y="0"/>
+          <a:ext cx="0" cy="0"/>
+          <a:chOff x="0" y="0"/>
+          <a:chExt cx="0" cy="0"/>
+        </a:xfrm>
+      </p:grpSpPr>
+      <p:sp>
+        <p:nvSpPr>
+          <p:cNvPr id="2" name="Title 1"/>
+          <p:cNvSpPr>
+            <a:spLocks noGrp="1"/>
+          </p:cNvSpPr>
+          <p:nvPr>
+            <p:ph type="title"/>
+          </p:nvPr>
+        </p:nvSpPr>
+        <p:spPr/>
+        <p:txBody>
+          <a:bodyPr/>
+          <a:lstStyle/>
+          <a:p>
+            <a:r>
+              <a:rPr lang="en-US" dirty="0"/>
+              <a:t>Add a Slide Title - 4</a:t>
+            </a:r>
+          </a:p>
+        </p:txBody>
+      </p:sp>
+      <p:sp>
+        <p:nvSpPr>
+          <p:cNvPr id="5" name="Content Placeholder 4"/>
+          <p:cNvSpPr>
+            <a:spLocks noGrp="1"/>
+          </p:cNvSpPr>
+          <p:nvPr>
+            <p:ph idx="1"/>
+          </p:nvPr>
+        </p:nvSpPr>
+        <p:spPr/>
+        <p:txBody>
+          <a:bodyPr/>
+          <a:lstStyle/>
+          <a:p>
+            <a:endParaRPr lang="en-US"/>
+          </a:p>
+        </p:txBody>
+      </p:sp>
+      <p:sp>
+        <p:nvSpPr>
+          <p:cNvPr id="6" name="Text Placeholder 5"/>
+          <p:cNvSpPr>
+            <a:spLocks noGrp="1"/>
+          </p:cNvSpPr>
+          <p:nvPr>
+            <p:ph type="body" sz="half" idx="2"/>
+          </p:nvPr>
+        </p:nvSpPr>
+        <p:spPr/>
+        <p:txBody>
+          <a:bodyPr/>
+          <a:lstStyle/>
+          <a:p>
+            <a:endParaRPr lang="en-US"/>
+          </a:p>
+        </p:txBody>
+      </p:sp>
+    </p:spTree>
+    <p:extLst>
+      <p:ext uri="{BB962C8B-B14F-4D97-AF65-F5344CB8AC3E}">
+        <p14:creationId xmlns:p14="http://schemas.microsoft.com/office/powerpoint/2010/main" val="4101607575"/>
+      </p:ext>
+    </p:extLst>
+  </p:cSld>
+  <p:clrMapOvr>
+    <a:masterClrMapping/>
+  </p:clrMapOvr>
+  <mc:AlternateContent xmlns:mc="http://schemas.openxmlformats.org/markup-compatibility/2006" xmlns:p14="http://schemas.microsoft.com/office/powerpoint/2010/main">
+    <mc:Choice Requires="p14">
+      <p:transition spd="med" p14:dur="700">
+        <p:fade/>
+      </p:transition>
+    </mc:Choice>
+    <mc:Fallback xmlns="">
+      <p:transition spd="med">
+        <p:fade/>
+      </p:transition>
+    </mc:Fallback>
+  </mc:AlternateContent>
+</p:sld>
+</file>
+
+<file path=ppt/slides/slide41.xml><?xml version="1.0" encoding="utf-8"?>
+<p:sld xmlns:a="http://schemas.openxmlformats.org/drawingml/2006/main" xmlns:r="http://schemas.openxmlformats.org/officeDocument/2006/relationships" xmlns:p="http://schemas.openxmlformats.org/presentationml/2006/main">
+  <p:cSld>
+    <p:spTree>
+      <p:nvGrpSpPr>
+        <p:cNvPr id="1" name=""/>
+        <p:cNvGrpSpPr/>
+        <p:nvPr/>
+      </p:nvGrpSpPr>
+      <p:grpSpPr>
+        <a:xfrm>
+          <a:off x="0" y="0"/>
+          <a:ext cx="0" cy="0"/>
+          <a:chOff x="0" y="0"/>
+          <a:chExt cx="0" cy="0"/>
+        </a:xfrm>
+      </p:grpSpPr>
+      <p:sp>
+        <p:nvSpPr>
+          <p:cNvPr id="3" name="Title 2"/>
+          <p:cNvSpPr>
+            <a:spLocks noGrp="1"/>
+          </p:cNvSpPr>
+          <p:nvPr>
+            <p:ph type="title"/>
+          </p:nvPr>
+        </p:nvSpPr>
+        <p:spPr/>
+        <p:txBody>
+          <a:bodyPr/>
+          <a:lstStyle/>
+          <a:p>
+            <a:r>
+              <a:rPr lang="en-US" dirty="0"/>
+              <a:t>Add a Slide Title - 5</a:t>
+            </a:r>
+          </a:p>
+        </p:txBody>
+      </p:sp>
+      <p:sp>
+        <p:nvSpPr>
+          <p:cNvPr id="5" name="Picture Placeholder 4"/>
+          <p:cNvSpPr>
+            <a:spLocks noGrp="1"/>
+          </p:cNvSpPr>
+          <p:nvPr>
+            <p:ph type="pic" idx="1"/>
+          </p:nvPr>
+        </p:nvSpPr>
+        <p:spPr/>
+      </p:sp>
+      <p:sp>
+        <p:nvSpPr>
+          <p:cNvPr id="6" name="Text Placeholder 5"/>
+          <p:cNvSpPr>
+            <a:spLocks noGrp="1"/>
+          </p:cNvSpPr>
+          <p:nvPr>
+            <p:ph type="body" sz="half" idx="2"/>
+          </p:nvPr>
+        </p:nvSpPr>
+        <p:spPr/>
+        <p:txBody>
+          <a:bodyPr/>
+          <a:lstStyle/>
+          <a:p>
+            <a:endParaRPr lang="en-US"/>
+          </a:p>
+        </p:txBody>
+      </p:sp>
+    </p:spTree>
+    <p:extLst>
+      <p:ext uri="{BB962C8B-B14F-4D97-AF65-F5344CB8AC3E}">
+        <p14:creationId xmlns:p14="http://schemas.microsoft.com/office/powerpoint/2010/main" val="2794409471"/>
+      </p:ext>
+    </p:extLst>
+  </p:cSld>
+  <p:clrMapOvr>
+    <a:masterClrMapping/>
+  </p:clrMapOvr>
+  <mc:AlternateContent xmlns:mc="http://schemas.openxmlformats.org/markup-compatibility/2006" xmlns:p14="http://schemas.microsoft.com/office/powerpoint/2010/main">
+    <mc:Choice Requires="p14">
+      <p:transition spd="med" p14:dur="700">
+        <p:fade/>
+      </p:transition>
+    </mc:Choice>
+    <mc:Fallback xmlns="">
+      <p:transition spd="med">
+        <p:fade/>
+      </p:transition>
+    </mc:Fallback>
+  </mc:AlternateContent>
+</p:sld>
+</file>
+
+<file path=ppt/slides/slide42.xml><?xml version="1.0" encoding="utf-8"?>
+<p:sld xmlns:a="http://schemas.openxmlformats.org/drawingml/2006/main" xmlns:r="http://schemas.openxmlformats.org/officeDocument/2006/relationships" xmlns:p="http://schemas.openxmlformats.org/presentationml/2006/main">
+  <p:cSld>
+    <p:spTree>
+      <p:nvGrpSpPr>
+        <p:cNvPr id="1" name=""/>
+        <p:cNvGrpSpPr/>
+        <p:nvPr/>
+      </p:nvGrpSpPr>
+      <p:grpSpPr>
+        <a:xfrm>
+          <a:off x="0" y="0"/>
+          <a:ext cx="0" cy="0"/>
+          <a:chOff x="0" y="0"/>
+          <a:chExt cx="0" cy="0"/>
+        </a:xfrm>
+      </p:grpSpPr>
+      <p:sp>
+        <p:nvSpPr>
+          <p:cNvPr id="2" name="Title 1">
+            <a:extLst>
+              <a:ext uri="{FF2B5EF4-FFF2-40B4-BE49-F238E27FC236}">
+                <a16:creationId xmlns:a16="http://schemas.microsoft.com/office/drawing/2014/main" id="{700032AE-86CF-4383-933C-9021A37A6D8F}"/>
+              </a:ext>
+            </a:extLst>
+          </p:cNvPr>
+          <p:cNvSpPr>
+            <a:spLocks noGrp="1"/>
+          </p:cNvSpPr>
+          <p:nvPr>
+            <p:ph type="title"/>
+          </p:nvPr>
+        </p:nvSpPr>
+        <p:spPr/>
+        <p:txBody>
+          <a:bodyPr/>
+          <a:lstStyle/>
+          <a:p>
+            <a:endParaRPr lang="tr-TR"/>
+          </a:p>
+        </p:txBody>
+      </p:sp>
+      <p:sp>
+        <p:nvSpPr>
+          <p:cNvPr id="3" name="Content Placeholder 2">
+            <a:extLst>
+              <a:ext uri="{FF2B5EF4-FFF2-40B4-BE49-F238E27FC236}">
+                <a16:creationId xmlns:a16="http://schemas.microsoft.com/office/drawing/2014/main" id="{7881CEEF-206D-46CC-A023-F63C0FD584C5}"/>
+              </a:ext>
+            </a:extLst>
+          </p:cNvPr>
+          <p:cNvSpPr>
+            <a:spLocks noGrp="1"/>
+          </p:cNvSpPr>
+          <p:nvPr>
+            <p:ph idx="1"/>
+          </p:nvPr>
+        </p:nvSpPr>
+        <p:spPr/>
+        <p:txBody>
+          <a:bodyPr/>
+          <a:lstStyle/>
+          <a:p>
+            <a:endParaRPr lang="tr-TR"/>
+          </a:p>
+        </p:txBody>
+      </p:sp>
+    </p:spTree>
+    <p:extLst>
+      <p:ext uri="{BB962C8B-B14F-4D97-AF65-F5344CB8AC3E}">
+        <p14:creationId xmlns:p14="http://schemas.microsoft.com/office/powerpoint/2010/main" val="4093661547"/>
       </p:ext>
     </p:extLst>
   </p:cSld>

</xml_diff>

<commit_message>
Completed the multi-tenancy presentation (as draft).
</commit_message>
<xml_diff>
--- a/2018-01-06-Multi-Tenancy/Multi-Tenancy.pptx
+++ b/2018-01-06-Multi-Tenancy/Multi-Tenancy.pptx
@@ -5,10 +5,10 @@
     <p:sldMasterId id="2147483648" r:id="rId1"/>
   </p:sldMasterIdLst>
   <p:notesMasterIdLst>
-    <p:notesMasterId r:id="rId59"/>
+    <p:notesMasterId r:id="rId66"/>
   </p:notesMasterIdLst>
   <p:handoutMasterIdLst>
-    <p:handoutMasterId r:id="rId60"/>
+    <p:handoutMasterId r:id="rId67"/>
   </p:handoutMasterIdLst>
   <p:sldIdLst>
     <p:sldId id="261" r:id="rId2"/>
@@ -61,13 +61,20 @@
     <p:sldId id="311" r:id="rId49"/>
     <p:sldId id="316" r:id="rId50"/>
     <p:sldId id="321" r:id="rId51"/>
-    <p:sldId id="317" r:id="rId52"/>
-    <p:sldId id="318" r:id="rId53"/>
-    <p:sldId id="319" r:id="rId54"/>
-    <p:sldId id="320" r:id="rId55"/>
-    <p:sldId id="269" r:id="rId56"/>
-    <p:sldId id="270" r:id="rId57"/>
-    <p:sldId id="276" r:id="rId58"/>
+    <p:sldId id="322" r:id="rId52"/>
+    <p:sldId id="317" r:id="rId53"/>
+    <p:sldId id="318" r:id="rId54"/>
+    <p:sldId id="324" r:id="rId55"/>
+    <p:sldId id="323" r:id="rId56"/>
+    <p:sldId id="325" r:id="rId57"/>
+    <p:sldId id="319" r:id="rId58"/>
+    <p:sldId id="326" r:id="rId59"/>
+    <p:sldId id="327" r:id="rId60"/>
+    <p:sldId id="330" r:id="rId61"/>
+    <p:sldId id="320" r:id="rId62"/>
+    <p:sldId id="328" r:id="rId63"/>
+    <p:sldId id="329" r:id="rId64"/>
+    <p:sldId id="331" r:id="rId65"/>
   </p:sldIdLst>
   <p:sldSz cx="12192000" cy="6858000"/>
   <p:notesSz cx="6858000" cy="9144000"/>
@@ -21188,13 +21195,8 @@
             <a:pPr lvl="1"/>
             <a:r>
               <a:rPr lang="en-US" dirty="0"/>
-              <a:t>Allows us to perform A/B </a:t>
-            </a:r>
-            <a:r>
-              <a:rPr lang="en-US"/>
-              <a:t>tests and previews.</a:t>
-            </a:r>
-            <a:endParaRPr lang="en-US" dirty="0"/>
+              <a:t>Allows us to perform A/B tests and previews.</a:t>
+            </a:r>
           </a:p>
           <a:p>
             <a:r>
@@ -21265,7 +21267,7 @@
           <p:cNvPr id="2" name="Title 1">
             <a:extLst>
               <a:ext uri="{FF2B5EF4-FFF2-40B4-BE49-F238E27FC236}">
-                <a16:creationId xmlns:a16="http://schemas.microsoft.com/office/drawing/2014/main" id="{4E9C2151-A3B6-4AD6-9F94-89C0A8F64BDE}"/>
+                <a16:creationId xmlns:a16="http://schemas.microsoft.com/office/drawing/2014/main" id="{9B3EBDE1-C46A-42BA-8FE9-CC5F8E3819EB}"/>
               </a:ext>
             </a:extLst>
           </p:cNvPr>
@@ -21281,16 +21283,20 @@
           <a:bodyPr/>
           <a:lstStyle/>
           <a:p>
-            <a:endParaRPr lang="tr-TR"/>
+            <a:r>
+              <a:rPr lang="en-US" dirty="0"/>
+              <a:t>Multi-Tenancy</a:t>
+            </a:r>
+            <a:endParaRPr lang="tr-TR" dirty="0"/>
           </a:p>
         </p:txBody>
       </p:sp>
       <p:sp>
         <p:nvSpPr>
-          <p:cNvPr id="3" name="Content Placeholder 2">
+          <p:cNvPr id="3" name="Text Placeholder 2">
             <a:extLst>
               <a:ext uri="{FF2B5EF4-FFF2-40B4-BE49-F238E27FC236}">
-                <a16:creationId xmlns:a16="http://schemas.microsoft.com/office/drawing/2014/main" id="{3D6586B6-B8F8-4271-81EB-C5B02463E9BB}"/>
+                <a16:creationId xmlns:a16="http://schemas.microsoft.com/office/drawing/2014/main" id="{545AF91A-86DC-4C2D-9A10-11DF673655AB}"/>
               </a:ext>
             </a:extLst>
           </p:cNvPr>
@@ -21298,7 +21304,7 @@
             <a:spLocks noGrp="1"/>
           </p:cNvSpPr>
           <p:nvPr>
-            <p:ph idx="1"/>
+            <p:ph type="body" idx="1"/>
           </p:nvPr>
         </p:nvSpPr>
         <p:spPr/>
@@ -21306,14 +21312,18 @@
           <a:bodyPr/>
           <a:lstStyle/>
           <a:p>
-            <a:endParaRPr lang="tr-TR"/>
+            <a:r>
+              <a:rPr lang="en-US" dirty="0"/>
+              <a:t>Best Practices, Optimizations &amp; Integrations</a:t>
+            </a:r>
+            <a:endParaRPr lang="tr-TR" dirty="0"/>
           </a:p>
         </p:txBody>
       </p:sp>
     </p:spTree>
     <p:extLst>
       <p:ext uri="{BB962C8B-B14F-4D97-AF65-F5344CB8AC3E}">
-        <p14:creationId xmlns:p14="http://schemas.microsoft.com/office/powerpoint/2010/main" val="3044351053"/>
+        <p14:creationId xmlns:p14="http://schemas.microsoft.com/office/powerpoint/2010/main" val="3294051223"/>
       </p:ext>
     </p:extLst>
   </p:cSld>
@@ -21357,7 +21367,7 @@
           <p:cNvPr id="2" name="Title 1">
             <a:extLst>
               <a:ext uri="{FF2B5EF4-FFF2-40B4-BE49-F238E27FC236}">
-                <a16:creationId xmlns:a16="http://schemas.microsoft.com/office/drawing/2014/main" id="{D0DBDFAB-3342-47E5-82CB-EB630FBC534C}"/>
+                <a16:creationId xmlns:a16="http://schemas.microsoft.com/office/drawing/2014/main" id="{4E9C2151-A3B6-4AD6-9F94-89C0A8F64BDE}"/>
               </a:ext>
             </a:extLst>
           </p:cNvPr>
@@ -21373,7 +21383,11 @@
           <a:bodyPr/>
           <a:lstStyle/>
           <a:p>
-            <a:endParaRPr lang="tr-TR"/>
+            <a:r>
+              <a:rPr lang="en-US" dirty="0"/>
+              <a:t>Separate Host &amp; Tenant Application</a:t>
+            </a:r>
+            <a:endParaRPr lang="tr-TR" dirty="0"/>
           </a:p>
         </p:txBody>
       </p:sp>
@@ -21382,7 +21396,7 @@
           <p:cNvPr id="3" name="Content Placeholder 2">
             <a:extLst>
               <a:ext uri="{FF2B5EF4-FFF2-40B4-BE49-F238E27FC236}">
-                <a16:creationId xmlns:a16="http://schemas.microsoft.com/office/drawing/2014/main" id="{EA54679D-D346-48FE-A3E1-9928DDBD9F50}"/>
+                <a16:creationId xmlns:a16="http://schemas.microsoft.com/office/drawing/2014/main" id="{3D6586B6-B8F8-4271-81EB-C5B02463E9BB}"/>
               </a:ext>
             </a:extLst>
           </p:cNvPr>
@@ -21398,14 +21412,65 @@
           <a:bodyPr/>
           <a:lstStyle/>
           <a:p>
-            <a:endParaRPr lang="tr-TR"/>
+            <a:r>
+              <a:rPr lang="en-US" dirty="0"/>
+              <a:t>Create two applications, deploy individually:</a:t>
+            </a:r>
+          </a:p>
+          <a:p>
+            <a:pPr lvl="1"/>
+            <a:r>
+              <a:rPr lang="en-US" dirty="0"/>
+              <a:t>Tenant application: The actual business application.</a:t>
+            </a:r>
+          </a:p>
+          <a:p>
+            <a:pPr lvl="2"/>
+            <a:r>
+              <a:rPr lang="en-US" dirty="0"/>
+              <a:t>Can be deployed as on-premise too.</a:t>
+            </a:r>
+          </a:p>
+          <a:p>
+            <a:pPr lvl="1"/>
+            <a:r>
+              <a:rPr lang="en-US" dirty="0"/>
+              <a:t>Host application: The application used by the host users to manage tenants.</a:t>
+            </a:r>
+          </a:p>
+          <a:p>
+            <a:pPr lvl="2"/>
+            <a:r>
+              <a:rPr lang="en-US" dirty="0"/>
+              <a:t>Do not include in an on-premise deployment.</a:t>
+            </a:r>
+          </a:p>
+          <a:p>
+            <a:pPr lvl="2"/>
+            <a:r>
+              <a:rPr lang="en-US" dirty="0"/>
+              <a:t>Separate data schema &amp; database from the tenant application.</a:t>
+            </a:r>
+          </a:p>
+          <a:p>
+            <a:pPr lvl="3"/>
+            <a:r>
+              <a:rPr lang="en-US" dirty="0"/>
+              <a:t>Store tenancy-related data: Tenants, Subscriptions, Payments, Editions… etc.</a:t>
+            </a:r>
+          </a:p>
+          <a:p>
+            <a:r>
+              <a:rPr lang="en-US" dirty="0"/>
+              <a:t>Reduces tenant context switch by design.</a:t>
+            </a:r>
           </a:p>
         </p:txBody>
       </p:sp>
     </p:spTree>
     <p:extLst>
       <p:ext uri="{BB962C8B-B14F-4D97-AF65-F5344CB8AC3E}">
-        <p14:creationId xmlns:p14="http://schemas.microsoft.com/office/powerpoint/2010/main" val="1810465420"/>
+        <p14:creationId xmlns:p14="http://schemas.microsoft.com/office/powerpoint/2010/main" val="3044351053"/>
       </p:ext>
     </p:extLst>
   </p:cSld>
@@ -21449,7 +21514,7 @@
           <p:cNvPr id="2" name="Title 1">
             <a:extLst>
               <a:ext uri="{FF2B5EF4-FFF2-40B4-BE49-F238E27FC236}">
-                <a16:creationId xmlns:a16="http://schemas.microsoft.com/office/drawing/2014/main" id="{5264EEA8-D91E-4C3C-89FF-8A4B2A76AC50}"/>
+                <a16:creationId xmlns:a16="http://schemas.microsoft.com/office/drawing/2014/main" id="{D0DBDFAB-3342-47E5-82CB-EB630FBC534C}"/>
               </a:ext>
             </a:extLst>
           </p:cNvPr>
@@ -21462,42 +21527,53 @@
         </p:nvSpPr>
         <p:spPr/>
         <p:txBody>
-          <a:bodyPr/>
+          <a:bodyPr anchor="t"/>
           <a:lstStyle/>
           <a:p>
-            <a:endParaRPr lang="tr-TR"/>
+            <a:r>
+              <a:rPr lang="en-US" dirty="0"/>
+              <a:t>ASP.NET Core Identity Integration</a:t>
+            </a:r>
+            <a:endParaRPr lang="tr-TR" dirty="0"/>
           </a:p>
         </p:txBody>
       </p:sp>
-      <p:sp>
-        <p:nvSpPr>
-          <p:cNvPr id="3" name="Content Placeholder 2">
+      <p:pic>
+        <p:nvPicPr>
+          <p:cNvPr id="4" name="Content Placeholder 3">
             <a:extLst>
               <a:ext uri="{FF2B5EF4-FFF2-40B4-BE49-F238E27FC236}">
-                <a16:creationId xmlns:a16="http://schemas.microsoft.com/office/drawing/2014/main" id="{9BEB9AF3-97F3-468E-B171-C89FEF7D4116}"/>
+                <a16:creationId xmlns:a16="http://schemas.microsoft.com/office/drawing/2014/main" id="{F90D1E4D-089F-42B1-804B-E8FE74D732F0}"/>
               </a:ext>
             </a:extLst>
           </p:cNvPr>
-          <p:cNvSpPr>
-            <a:spLocks noGrp="1"/>
-          </p:cNvSpPr>
+          <p:cNvPicPr>
+            <a:picLocks noGrp="1" noChangeAspect="1"/>
+          </p:cNvPicPr>
           <p:nvPr>
             <p:ph idx="1"/>
           </p:nvPr>
-        </p:nvSpPr>
-        <p:spPr/>
-        <p:txBody>
-          <a:bodyPr/>
-          <a:lstStyle/>
-          <a:p>
-            <a:endParaRPr lang="tr-TR"/>
-          </a:p>
-        </p:txBody>
-      </p:sp>
+        </p:nvPicPr>
+        <p:blipFill>
+          <a:blip r:embed="rId2"/>
+          <a:stretch>
+            <a:fillRect/>
+          </a:stretch>
+        </p:blipFill>
+        <p:spPr>
+          <a:xfrm>
+            <a:off x="2172958" y="1328688"/>
+            <a:ext cx="7846083" cy="4667154"/>
+          </a:xfrm>
+          <a:prstGeom prst="rect">
+            <a:avLst/>
+          </a:prstGeom>
+        </p:spPr>
+      </p:pic>
     </p:spTree>
     <p:extLst>
       <p:ext uri="{BB962C8B-B14F-4D97-AF65-F5344CB8AC3E}">
-        <p14:creationId xmlns:p14="http://schemas.microsoft.com/office/powerpoint/2010/main" val="1090297085"/>
+        <p14:creationId xmlns:p14="http://schemas.microsoft.com/office/powerpoint/2010/main" val="1810465420"/>
       </p:ext>
     </p:extLst>
   </p:cSld>
@@ -21541,7 +21617,7 @@
           <p:cNvPr id="2" name="Title 1">
             <a:extLst>
               <a:ext uri="{FF2B5EF4-FFF2-40B4-BE49-F238E27FC236}">
-                <a16:creationId xmlns:a16="http://schemas.microsoft.com/office/drawing/2014/main" id="{00069E1A-8A6F-4DC6-8666-9EBE03803AA5}"/>
+                <a16:creationId xmlns:a16="http://schemas.microsoft.com/office/drawing/2014/main" id="{5DB1A372-B9F1-4D0F-B023-F1E13AF2F203}"/>
               </a:ext>
             </a:extLst>
           </p:cNvPr>
@@ -21554,42 +21630,53 @@
         </p:nvSpPr>
         <p:spPr/>
         <p:txBody>
-          <a:bodyPr/>
+          <a:bodyPr anchor="t"/>
           <a:lstStyle/>
           <a:p>
-            <a:endParaRPr lang="tr-TR"/>
+            <a:r>
+              <a:rPr lang="en-US" dirty="0"/>
+              <a:t>IdentityServer4 Integration</a:t>
+            </a:r>
+            <a:endParaRPr lang="tr-TR" dirty="0"/>
           </a:p>
         </p:txBody>
       </p:sp>
-      <p:sp>
-        <p:nvSpPr>
-          <p:cNvPr id="3" name="Content Placeholder 2">
+      <p:pic>
+        <p:nvPicPr>
+          <p:cNvPr id="4" name="Content Placeholder 3">
             <a:extLst>
               <a:ext uri="{FF2B5EF4-FFF2-40B4-BE49-F238E27FC236}">
-                <a16:creationId xmlns:a16="http://schemas.microsoft.com/office/drawing/2014/main" id="{5DD9F222-E0CA-435D-879F-15F56CB27454}"/>
+                <a16:creationId xmlns:a16="http://schemas.microsoft.com/office/drawing/2014/main" id="{6271DAE4-C83E-4285-A0E3-C189557BA3C1}"/>
               </a:ext>
             </a:extLst>
           </p:cNvPr>
-          <p:cNvSpPr>
-            <a:spLocks noGrp="1"/>
-          </p:cNvSpPr>
+          <p:cNvPicPr>
+            <a:picLocks noGrp="1" noChangeAspect="1"/>
+          </p:cNvPicPr>
           <p:nvPr>
             <p:ph idx="1"/>
           </p:nvPr>
-        </p:nvSpPr>
-        <p:spPr/>
-        <p:txBody>
-          <a:bodyPr/>
-          <a:lstStyle/>
-          <a:p>
-            <a:endParaRPr lang="tr-TR"/>
-          </a:p>
-        </p:txBody>
-      </p:sp>
+        </p:nvPicPr>
+        <p:blipFill>
+          <a:blip r:embed="rId2"/>
+          <a:stretch>
+            <a:fillRect/>
+          </a:stretch>
+        </p:blipFill>
+        <p:spPr>
+          <a:xfrm>
+            <a:off x="1338418" y="1374711"/>
+            <a:ext cx="9515163" cy="4512906"/>
+          </a:xfrm>
+          <a:prstGeom prst="rect">
+            <a:avLst/>
+          </a:prstGeom>
+        </p:spPr>
+      </p:pic>
     </p:spTree>
     <p:extLst>
       <p:ext uri="{BB962C8B-B14F-4D97-AF65-F5344CB8AC3E}">
-        <p14:creationId xmlns:p14="http://schemas.microsoft.com/office/powerpoint/2010/main" val="4143215811"/>
+        <p14:creationId xmlns:p14="http://schemas.microsoft.com/office/powerpoint/2010/main" val="3315002299"/>
       </p:ext>
     </p:extLst>
   </p:cSld>
@@ -21630,7 +21717,13 @@
       </p:grpSpPr>
       <p:sp>
         <p:nvSpPr>
-          <p:cNvPr id="2" name="Title 1"/>
+          <p:cNvPr id="2" name="Title 1">
+            <a:extLst>
+              <a:ext uri="{FF2B5EF4-FFF2-40B4-BE49-F238E27FC236}">
+                <a16:creationId xmlns:a16="http://schemas.microsoft.com/office/drawing/2014/main" id="{3BCCB477-A5C6-46DF-AC77-3F98D68769FA}"/>
+              </a:ext>
+            </a:extLst>
+          </p:cNvPr>
           <p:cNvSpPr>
             <a:spLocks noGrp="1"/>
           </p:cNvSpPr>
@@ -21645,14 +21738,25 @@
           <a:p>
             <a:r>
               <a:rPr lang="en-US" dirty="0"/>
-              <a:t>Add a Slide Title - 4</a:t>
-            </a:r>
+              <a:t>Partition Tables / Indexes by </a:t>
+            </a:r>
+            <a:r>
+              <a:rPr lang="en-US" dirty="0" err="1"/>
+              <a:t>TenantId</a:t>
+            </a:r>
+            <a:endParaRPr lang="tr-TR" dirty="0"/>
           </a:p>
         </p:txBody>
       </p:sp>
       <p:sp>
         <p:nvSpPr>
-          <p:cNvPr id="5" name="Content Placeholder 4"/>
+          <p:cNvPr id="3" name="Content Placeholder 2">
+            <a:extLst>
+              <a:ext uri="{FF2B5EF4-FFF2-40B4-BE49-F238E27FC236}">
+                <a16:creationId xmlns:a16="http://schemas.microsoft.com/office/drawing/2014/main" id="{5E0850DB-6EA5-4196-8F7E-D7E89209C313}"/>
+              </a:ext>
+            </a:extLst>
+          </p:cNvPr>
           <p:cNvSpPr>
             <a:spLocks noGrp="1"/>
           </p:cNvSpPr>
@@ -21665,33 +21769,40 @@
           <a:bodyPr/>
           <a:lstStyle/>
           <a:p>
-            <a:endParaRPr lang="en-US"/>
-          </a:p>
-        </p:txBody>
-      </p:sp>
-      <p:sp>
-        <p:nvSpPr>
-          <p:cNvPr id="6" name="Text Placeholder 5"/>
-          <p:cNvSpPr>
-            <a:spLocks noGrp="1"/>
-          </p:cNvSpPr>
-          <p:nvPr>
-            <p:ph type="body" sz="half" idx="2"/>
-          </p:nvPr>
-        </p:nvSpPr>
-        <p:spPr/>
-        <p:txBody>
-          <a:bodyPr/>
-          <a:lstStyle/>
-          <a:p>
-            <a:endParaRPr lang="en-US"/>
+            <a:r>
+              <a:rPr lang="en-US" dirty="0"/>
+              <a:t>Create partitions for all (or big) tables by </a:t>
+            </a:r>
+            <a:r>
+              <a:rPr lang="en-US" dirty="0" err="1"/>
+              <a:t>TenantId</a:t>
+            </a:r>
+            <a:r>
+              <a:rPr lang="en-US" dirty="0"/>
+              <a:t>.</a:t>
+            </a:r>
+          </a:p>
+          <a:p>
+            <a:r>
+              <a:rPr lang="en-US" dirty="0"/>
+              <a:t>Or Create </a:t>
+            </a:r>
+            <a:r>
+              <a:rPr lang="en-US" dirty="0" err="1"/>
+              <a:t>TenantId</a:t>
+            </a:r>
+            <a:r>
+              <a:rPr lang="en-US" dirty="0"/>
+              <a:t> indexes.</a:t>
+            </a:r>
+            <a:endParaRPr lang="tr-TR" dirty="0"/>
           </a:p>
         </p:txBody>
       </p:sp>
     </p:spTree>
     <p:extLst>
       <p:ext uri="{BB962C8B-B14F-4D97-AF65-F5344CB8AC3E}">
-        <p14:creationId xmlns:p14="http://schemas.microsoft.com/office/powerpoint/2010/main" val="4101607575"/>
+        <p14:creationId xmlns:p14="http://schemas.microsoft.com/office/powerpoint/2010/main" val="3889694038"/>
       </p:ext>
     </p:extLst>
   </p:cSld>
@@ -21732,7 +21843,13 @@
       </p:grpSpPr>
       <p:sp>
         <p:nvSpPr>
-          <p:cNvPr id="3" name="Title 2"/>
+          <p:cNvPr id="2" name="Title 1">
+            <a:extLst>
+              <a:ext uri="{FF2B5EF4-FFF2-40B4-BE49-F238E27FC236}">
+                <a16:creationId xmlns:a16="http://schemas.microsoft.com/office/drawing/2014/main" id="{02A077FB-0CE7-40D6-9191-DBD704459D87}"/>
+              </a:ext>
+            </a:extLst>
+          </p:cNvPr>
           <p:cNvSpPr>
             <a:spLocks noGrp="1"/>
           </p:cNvSpPr>
@@ -21747,31 +21864,26 @@
           <a:p>
             <a:r>
               <a:rPr lang="en-US" dirty="0"/>
-              <a:t>Add a Slide Title - 5</a:t>
-            </a:r>
+              <a:t>Multi-Tenancy</a:t>
+            </a:r>
+            <a:endParaRPr lang="tr-TR" dirty="0"/>
           </a:p>
         </p:txBody>
       </p:sp>
       <p:sp>
         <p:nvSpPr>
-          <p:cNvPr id="5" name="Picture Placeholder 4"/>
+          <p:cNvPr id="3" name="Text Placeholder 2">
+            <a:extLst>
+              <a:ext uri="{FF2B5EF4-FFF2-40B4-BE49-F238E27FC236}">
+                <a16:creationId xmlns:a16="http://schemas.microsoft.com/office/drawing/2014/main" id="{99CA0C65-1142-45DA-A18C-FEE7A8EE9F63}"/>
+              </a:ext>
+            </a:extLst>
+          </p:cNvPr>
           <p:cNvSpPr>
             <a:spLocks noGrp="1"/>
           </p:cNvSpPr>
           <p:nvPr>
-            <p:ph type="pic" idx="1"/>
-          </p:nvPr>
-        </p:nvSpPr>
-        <p:spPr/>
-      </p:sp>
-      <p:sp>
-        <p:nvSpPr>
-          <p:cNvPr id="6" name="Text Placeholder 5"/>
-          <p:cNvSpPr>
-            <a:spLocks noGrp="1"/>
-          </p:cNvSpPr>
-          <p:nvPr>
-            <p:ph type="body" sz="half" idx="2"/>
+            <p:ph type="body" idx="1"/>
           </p:nvPr>
         </p:nvSpPr>
         <p:spPr/>
@@ -21779,14 +21891,18 @@
           <a:bodyPr/>
           <a:lstStyle/>
           <a:p>
-            <a:endParaRPr lang="en-US"/>
+            <a:r>
+              <a:rPr lang="en-US" dirty="0"/>
+              <a:t>SaaS Features</a:t>
+            </a:r>
+            <a:endParaRPr lang="tr-TR" dirty="0"/>
           </a:p>
         </p:txBody>
       </p:sp>
     </p:spTree>
     <p:extLst>
       <p:ext uri="{BB962C8B-B14F-4D97-AF65-F5344CB8AC3E}">
-        <p14:creationId xmlns:p14="http://schemas.microsoft.com/office/powerpoint/2010/main" val="2794409471"/>
+        <p14:creationId xmlns:p14="http://schemas.microsoft.com/office/powerpoint/2010/main" val="2106742891"/>
       </p:ext>
     </p:extLst>
   </p:cSld>
@@ -21830,7 +21946,7 @@
           <p:cNvPr id="2" name="Title 1">
             <a:extLst>
               <a:ext uri="{FF2B5EF4-FFF2-40B4-BE49-F238E27FC236}">
-                <a16:creationId xmlns:a16="http://schemas.microsoft.com/office/drawing/2014/main" id="{700032AE-86CF-4383-933C-9021A37A6D8F}"/>
+                <a16:creationId xmlns:a16="http://schemas.microsoft.com/office/drawing/2014/main" id="{5264EEA8-D91E-4C3C-89FF-8A4B2A76AC50}"/>
               </a:ext>
             </a:extLst>
           </p:cNvPr>
@@ -21846,7 +21962,11 @@
           <a:bodyPr/>
           <a:lstStyle/>
           <a:p>
-            <a:endParaRPr lang="tr-TR"/>
+            <a:r>
+              <a:rPr lang="en-US" dirty="0"/>
+              <a:t>Feature / Package / Subscription System</a:t>
+            </a:r>
+            <a:endParaRPr lang="tr-TR" dirty="0"/>
           </a:p>
         </p:txBody>
       </p:sp>
@@ -21855,7 +21975,7 @@
           <p:cNvPr id="3" name="Content Placeholder 2">
             <a:extLst>
               <a:ext uri="{FF2B5EF4-FFF2-40B4-BE49-F238E27FC236}">
-                <a16:creationId xmlns:a16="http://schemas.microsoft.com/office/drawing/2014/main" id="{7881CEEF-206D-46CC-A023-F63C0FD584C5}"/>
+                <a16:creationId xmlns:a16="http://schemas.microsoft.com/office/drawing/2014/main" id="{9BEB9AF3-97F3-468E-B171-C89FEF7D4116}"/>
               </a:ext>
             </a:extLst>
           </p:cNvPr>
@@ -21868,17 +21988,400 @@
         </p:nvSpPr>
         <p:spPr/>
         <p:txBody>
-          <a:bodyPr/>
+          <a:bodyPr>
+            <a:normAutofit/>
+          </a:bodyPr>
           <a:lstStyle/>
           <a:p>
-            <a:endParaRPr lang="tr-TR"/>
+            <a:r>
+              <a:rPr lang="en-US" b="1" dirty="0"/>
+              <a:t>Define features</a:t>
+            </a:r>
+            <a:r>
+              <a:rPr lang="en-US" dirty="0"/>
+              <a:t> of the application. Feature Types:</a:t>
+            </a:r>
+          </a:p>
+          <a:p>
+            <a:pPr lvl="1"/>
+            <a:r>
+              <a:rPr lang="en-US" b="1" dirty="0"/>
+              <a:t>On/Off</a:t>
+            </a:r>
+            <a:r>
+              <a:rPr lang="en-US" dirty="0"/>
+              <a:t>: Excel export, Replying by email (for a support app)…</a:t>
+            </a:r>
+          </a:p>
+          <a:p>
+            <a:pPr lvl="1"/>
+            <a:r>
+              <a:rPr lang="en-US" b="1" dirty="0"/>
+              <a:t>Numeric</a:t>
+            </a:r>
+            <a:r>
+              <a:rPr lang="en-US" dirty="0"/>
+              <a:t>:10 users, 20,000 emails/month…</a:t>
+            </a:r>
+          </a:p>
+          <a:p>
+            <a:pPr lvl="1"/>
+            <a:r>
+              <a:rPr lang="en-US" b="1" dirty="0"/>
+              <a:t>Selection</a:t>
+            </a:r>
+            <a:r>
+              <a:rPr lang="en-US" dirty="0"/>
+              <a:t>: one of the available options.</a:t>
+            </a:r>
+          </a:p>
+          <a:p>
+            <a:r>
+              <a:rPr lang="en-US" dirty="0"/>
+              <a:t>Group features into </a:t>
+            </a:r>
+            <a:r>
+              <a:rPr lang="en-US" b="1" dirty="0"/>
+              <a:t>packages/editions</a:t>
+            </a:r>
+            <a:r>
+              <a:rPr lang="en-US" dirty="0"/>
+              <a:t>.</a:t>
+            </a:r>
+          </a:p>
+          <a:p>
+            <a:r>
+              <a:rPr lang="en-US" b="1" dirty="0"/>
+              <a:t>Subscribe</a:t>
+            </a:r>
+            <a:r>
+              <a:rPr lang="en-US" dirty="0"/>
+              <a:t> packages by tenants.</a:t>
+            </a:r>
+          </a:p>
+          <a:p>
+            <a:r>
+              <a:rPr lang="en-US" b="1" dirty="0"/>
+              <a:t>Check features</a:t>
+            </a:r>
+            <a:r>
+              <a:rPr lang="en-US" dirty="0"/>
+              <a:t>: Declarative or by code</a:t>
+            </a:r>
+            <a:endParaRPr lang="tr-TR" dirty="0"/>
           </a:p>
         </p:txBody>
       </p:sp>
     </p:spTree>
     <p:extLst>
       <p:ext uri="{BB962C8B-B14F-4D97-AF65-F5344CB8AC3E}">
-        <p14:creationId xmlns:p14="http://schemas.microsoft.com/office/powerpoint/2010/main" val="4093661547"/>
+        <p14:creationId xmlns:p14="http://schemas.microsoft.com/office/powerpoint/2010/main" val="1090297085"/>
+      </p:ext>
+    </p:extLst>
+  </p:cSld>
+  <p:clrMapOvr>
+    <a:masterClrMapping/>
+  </p:clrMapOvr>
+  <mc:AlternateContent xmlns:mc="http://schemas.openxmlformats.org/markup-compatibility/2006" xmlns:p14="http://schemas.microsoft.com/office/powerpoint/2010/main">
+    <mc:Choice Requires="p14">
+      <p:transition spd="med" p14:dur="700">
+        <p:fade/>
+      </p:transition>
+    </mc:Choice>
+    <mc:Fallback xmlns="">
+      <p:transition spd="med">
+        <p:fade/>
+      </p:transition>
+    </mc:Fallback>
+  </mc:AlternateContent>
+</p:sld>
+</file>
+
+<file path=ppt/slides/slide58.xml><?xml version="1.0" encoding="utf-8"?>
+<p:sld xmlns:a="http://schemas.openxmlformats.org/drawingml/2006/main" xmlns:r="http://schemas.openxmlformats.org/officeDocument/2006/relationships" xmlns:p="http://schemas.openxmlformats.org/presentationml/2006/main">
+  <p:cSld>
+    <p:spTree>
+      <p:nvGrpSpPr>
+        <p:cNvPr id="1" name=""/>
+        <p:cNvGrpSpPr/>
+        <p:nvPr/>
+      </p:nvGrpSpPr>
+      <p:grpSpPr>
+        <a:xfrm>
+          <a:off x="0" y="0"/>
+          <a:ext cx="0" cy="0"/>
+          <a:chOff x="0" y="0"/>
+          <a:chExt cx="0" cy="0"/>
+        </a:xfrm>
+      </p:grpSpPr>
+      <p:sp>
+        <p:nvSpPr>
+          <p:cNvPr id="2" name="Title 1">
+            <a:extLst>
+              <a:ext uri="{FF2B5EF4-FFF2-40B4-BE49-F238E27FC236}">
+                <a16:creationId xmlns:a16="http://schemas.microsoft.com/office/drawing/2014/main" id="{73CA1239-A77C-4989-8811-C87C952483F7}"/>
+              </a:ext>
+            </a:extLst>
+          </p:cNvPr>
+          <p:cNvSpPr>
+            <a:spLocks noGrp="1"/>
+          </p:cNvSpPr>
+          <p:nvPr>
+            <p:ph type="title"/>
+          </p:nvPr>
+        </p:nvSpPr>
+        <p:spPr/>
+        <p:txBody>
+          <a:bodyPr/>
+          <a:lstStyle/>
+          <a:p>
+            <a:r>
+              <a:rPr lang="en-US" dirty="0"/>
+              <a:t>Feature Checking</a:t>
+            </a:r>
+            <a:endParaRPr lang="tr-TR" dirty="0"/>
+          </a:p>
+        </p:txBody>
+      </p:sp>
+      <p:pic>
+        <p:nvPicPr>
+          <p:cNvPr id="4" name="Content Placeholder 3">
+            <a:extLst>
+              <a:ext uri="{FF2B5EF4-FFF2-40B4-BE49-F238E27FC236}">
+                <a16:creationId xmlns:a16="http://schemas.microsoft.com/office/drawing/2014/main" id="{7CE884B2-86EE-41E5-ABE3-2DCC5C024E54}"/>
+              </a:ext>
+            </a:extLst>
+          </p:cNvPr>
+          <p:cNvPicPr>
+            <a:picLocks noGrp="1" noChangeAspect="1"/>
+          </p:cNvPicPr>
+          <p:nvPr>
+            <p:ph idx="1"/>
+          </p:nvPr>
+        </p:nvPicPr>
+        <p:blipFill>
+          <a:blip r:embed="rId2"/>
+          <a:stretch>
+            <a:fillRect/>
+          </a:stretch>
+        </p:blipFill>
+        <p:spPr>
+          <a:xfrm>
+            <a:off x="1202093" y="1745116"/>
+            <a:ext cx="6387095" cy="1473945"/>
+          </a:xfrm>
+          <a:prstGeom prst="rect">
+            <a:avLst/>
+          </a:prstGeom>
+        </p:spPr>
+      </p:pic>
+      <p:pic>
+        <p:nvPicPr>
+          <p:cNvPr id="5" name="Picture 4">
+            <a:extLst>
+              <a:ext uri="{FF2B5EF4-FFF2-40B4-BE49-F238E27FC236}">
+                <a16:creationId xmlns:a16="http://schemas.microsoft.com/office/drawing/2014/main" id="{7B4A75FE-35BA-4683-B137-9E104A9617BF}"/>
+              </a:ext>
+            </a:extLst>
+          </p:cNvPr>
+          <p:cNvPicPr>
+            <a:picLocks noChangeAspect="1"/>
+          </p:cNvPicPr>
+          <p:nvPr/>
+        </p:nvPicPr>
+        <p:blipFill>
+          <a:blip r:embed="rId3"/>
+          <a:stretch>
+            <a:fillRect/>
+          </a:stretch>
+        </p:blipFill>
+        <p:spPr>
+          <a:xfrm>
+            <a:off x="1295399" y="3805723"/>
+            <a:ext cx="9552897" cy="2016579"/>
+          </a:xfrm>
+          <a:prstGeom prst="rect">
+            <a:avLst/>
+          </a:prstGeom>
+        </p:spPr>
+      </p:pic>
+    </p:spTree>
+    <p:extLst>
+      <p:ext uri="{BB962C8B-B14F-4D97-AF65-F5344CB8AC3E}">
+        <p14:creationId xmlns:p14="http://schemas.microsoft.com/office/powerpoint/2010/main" val="805898745"/>
+      </p:ext>
+    </p:extLst>
+  </p:cSld>
+  <p:clrMapOvr>
+    <a:masterClrMapping/>
+  </p:clrMapOvr>
+  <mc:AlternateContent xmlns:mc="http://schemas.openxmlformats.org/markup-compatibility/2006" xmlns:p14="http://schemas.microsoft.com/office/powerpoint/2010/main">
+    <mc:Choice Requires="p14">
+      <p:transition spd="med" p14:dur="700">
+        <p:fade/>
+      </p:transition>
+    </mc:Choice>
+    <mc:Fallback xmlns="">
+      <p:transition spd="med">
+        <p:fade/>
+      </p:transition>
+    </mc:Fallback>
+  </mc:AlternateContent>
+</p:sld>
+</file>
+
+<file path=ppt/slides/slide59.xml><?xml version="1.0" encoding="utf-8"?>
+<p:sld xmlns:a="http://schemas.openxmlformats.org/drawingml/2006/main" xmlns:r="http://schemas.openxmlformats.org/officeDocument/2006/relationships" xmlns:p="http://schemas.openxmlformats.org/presentationml/2006/main">
+  <p:cSld>
+    <p:spTree>
+      <p:nvGrpSpPr>
+        <p:cNvPr id="1" name=""/>
+        <p:cNvGrpSpPr/>
+        <p:nvPr/>
+      </p:nvGrpSpPr>
+      <p:grpSpPr>
+        <a:xfrm>
+          <a:off x="0" y="0"/>
+          <a:ext cx="0" cy="0"/>
+          <a:chOff x="0" y="0"/>
+          <a:chExt cx="0" cy="0"/>
+        </a:xfrm>
+      </p:grpSpPr>
+      <p:sp>
+        <p:nvSpPr>
+          <p:cNvPr id="2" name="Title 1">
+            <a:extLst>
+              <a:ext uri="{FF2B5EF4-FFF2-40B4-BE49-F238E27FC236}">
+                <a16:creationId xmlns:a16="http://schemas.microsoft.com/office/drawing/2014/main" id="{C0E853EB-FAEE-4441-AB6C-70E5B811F334}"/>
+              </a:ext>
+            </a:extLst>
+          </p:cNvPr>
+          <p:cNvSpPr>
+            <a:spLocks noGrp="1"/>
+          </p:cNvSpPr>
+          <p:nvPr>
+            <p:ph type="title"/>
+          </p:nvPr>
+        </p:nvSpPr>
+        <p:spPr/>
+        <p:txBody>
+          <a:bodyPr/>
+          <a:lstStyle/>
+          <a:p>
+            <a:r>
+              <a:rPr lang="en-US" dirty="0"/>
+              <a:t>Declarative Feature Check</a:t>
+            </a:r>
+            <a:br>
+              <a:rPr lang="en-US" dirty="0"/>
+            </a:br>
+            <a:r>
+              <a:rPr lang="en-US" sz="2400" dirty="0"/>
+              <a:t>Implementation Options</a:t>
+            </a:r>
+            <a:endParaRPr lang="tr-TR" dirty="0"/>
+          </a:p>
+        </p:txBody>
+      </p:sp>
+      <p:sp>
+        <p:nvSpPr>
+          <p:cNvPr id="3" name="Content Placeholder 2">
+            <a:extLst>
+              <a:ext uri="{FF2B5EF4-FFF2-40B4-BE49-F238E27FC236}">
+                <a16:creationId xmlns:a16="http://schemas.microsoft.com/office/drawing/2014/main" id="{1C849BB4-88CD-4AED-AF0F-640C65BE1543}"/>
+              </a:ext>
+            </a:extLst>
+          </p:cNvPr>
+          <p:cNvSpPr>
+            <a:spLocks noGrp="1"/>
+          </p:cNvSpPr>
+          <p:nvPr>
+            <p:ph idx="1"/>
+          </p:nvPr>
+        </p:nvSpPr>
+        <p:spPr/>
+        <p:txBody>
+          <a:bodyPr>
+            <a:normAutofit/>
+          </a:bodyPr>
+          <a:lstStyle/>
+          <a:p>
+            <a:r>
+              <a:rPr lang="en-US" dirty="0"/>
+              <a:t>MVC Action Filters</a:t>
+            </a:r>
+          </a:p>
+          <a:p>
+            <a:pPr lvl="1"/>
+            <a:r>
+              <a:rPr lang="en-US" dirty="0"/>
+              <a:t>Easy to implement. Naturally works within ASP.NET Core.</a:t>
+            </a:r>
+          </a:p>
+          <a:p>
+            <a:pPr lvl="1"/>
+            <a:r>
+              <a:rPr lang="en-US" dirty="0"/>
+              <a:t>Limited to Controller actions.</a:t>
+            </a:r>
+          </a:p>
+          <a:p>
+            <a:r>
+              <a:rPr lang="en-US" dirty="0"/>
+              <a:t>Method Interception using dynamic proxying.</a:t>
+            </a:r>
+          </a:p>
+          <a:p>
+            <a:pPr lvl="1"/>
+            <a:r>
+              <a:rPr lang="en-US" dirty="0"/>
+              <a:t>Works everywhere.</a:t>
+            </a:r>
+          </a:p>
+          <a:p>
+            <a:pPr lvl="1"/>
+            <a:r>
+              <a:rPr lang="en-US" dirty="0"/>
+              <a:t>Limited to virtual methods.</a:t>
+            </a:r>
+          </a:p>
+          <a:p>
+            <a:r>
+              <a:rPr lang="en-US" dirty="0"/>
+              <a:t>Weaving: </a:t>
+            </a:r>
+            <a:r>
+              <a:rPr lang="en-US" dirty="0" err="1"/>
+              <a:t>Mono.Cecil</a:t>
+            </a:r>
+            <a:r>
+              <a:rPr lang="en-US" dirty="0"/>
+              <a:t>, </a:t>
+            </a:r>
+            <a:r>
+              <a:rPr lang="en-US" dirty="0" err="1"/>
+              <a:t>Fody</a:t>
+            </a:r>
+            <a:r>
+              <a:rPr lang="en-US" dirty="0"/>
+              <a:t>, </a:t>
+            </a:r>
+            <a:r>
+              <a:rPr lang="en-US" dirty="0" err="1"/>
+              <a:t>Postsharp</a:t>
+            </a:r>
+            <a:r>
+              <a:rPr lang="en-US" dirty="0"/>
+              <a:t>… etc.</a:t>
+            </a:r>
+            <a:endParaRPr lang="tr-TR" dirty="0"/>
+          </a:p>
+        </p:txBody>
+      </p:sp>
+    </p:spTree>
+    <p:extLst>
+      <p:ext uri="{BB962C8B-B14F-4D97-AF65-F5344CB8AC3E}">
+        <p14:creationId xmlns:p14="http://schemas.microsoft.com/office/powerpoint/2010/main" val="1942701493"/>
       </p:ext>
     </p:extLst>
   </p:cSld>
@@ -22015,6 +22518,659 @@
     <p:extLst>
       <p:ext uri="{BB962C8B-B14F-4D97-AF65-F5344CB8AC3E}">
         <p14:creationId xmlns:p14="http://schemas.microsoft.com/office/powerpoint/2010/main" val="1300805094"/>
+      </p:ext>
+    </p:extLst>
+  </p:cSld>
+  <p:clrMapOvr>
+    <a:masterClrMapping/>
+  </p:clrMapOvr>
+  <mc:AlternateContent xmlns:mc="http://schemas.openxmlformats.org/markup-compatibility/2006" xmlns:p14="http://schemas.microsoft.com/office/powerpoint/2010/main">
+    <mc:Choice Requires="p14">
+      <p:transition spd="med" p14:dur="700">
+        <p:fade/>
+      </p:transition>
+    </mc:Choice>
+    <mc:Fallback xmlns="">
+      <p:transition spd="med">
+        <p:fade/>
+      </p:transition>
+    </mc:Fallback>
+  </mc:AlternateContent>
+</p:sld>
+</file>
+
+<file path=ppt/slides/slide60.xml><?xml version="1.0" encoding="utf-8"?>
+<p:sld xmlns:a="http://schemas.openxmlformats.org/drawingml/2006/main" xmlns:r="http://schemas.openxmlformats.org/officeDocument/2006/relationships" xmlns:p="http://schemas.openxmlformats.org/presentationml/2006/main">
+  <p:cSld>
+    <p:spTree>
+      <p:nvGrpSpPr>
+        <p:cNvPr id="1" name=""/>
+        <p:cNvGrpSpPr/>
+        <p:nvPr/>
+      </p:nvGrpSpPr>
+      <p:grpSpPr>
+        <a:xfrm>
+          <a:off x="0" y="0"/>
+          <a:ext cx="0" cy="0"/>
+          <a:chOff x="0" y="0"/>
+          <a:chExt cx="0" cy="0"/>
+        </a:xfrm>
+      </p:grpSpPr>
+      <p:sp>
+        <p:nvSpPr>
+          <p:cNvPr id="2" name="Title 1">
+            <a:extLst>
+              <a:ext uri="{FF2B5EF4-FFF2-40B4-BE49-F238E27FC236}">
+                <a16:creationId xmlns:a16="http://schemas.microsoft.com/office/drawing/2014/main" id="{983849C8-1458-42AD-AA16-46B8587D0A54}"/>
+              </a:ext>
+            </a:extLst>
+          </p:cNvPr>
+          <p:cNvSpPr>
+            <a:spLocks noGrp="1"/>
+          </p:cNvSpPr>
+          <p:nvPr>
+            <p:ph type="title"/>
+          </p:nvPr>
+        </p:nvSpPr>
+        <p:spPr/>
+        <p:txBody>
+          <a:bodyPr/>
+          <a:lstStyle/>
+          <a:p>
+            <a:r>
+              <a:rPr lang="en-US" dirty="0"/>
+              <a:t>Multi-Tenancy</a:t>
+            </a:r>
+            <a:endParaRPr lang="tr-TR" dirty="0"/>
+          </a:p>
+        </p:txBody>
+      </p:sp>
+      <p:sp>
+        <p:nvSpPr>
+          <p:cNvPr id="3" name="Text Placeholder 2">
+            <a:extLst>
+              <a:ext uri="{FF2B5EF4-FFF2-40B4-BE49-F238E27FC236}">
+                <a16:creationId xmlns:a16="http://schemas.microsoft.com/office/drawing/2014/main" id="{0535A617-6395-4C46-A95B-AF38E57A48EA}"/>
+              </a:ext>
+            </a:extLst>
+          </p:cNvPr>
+          <p:cNvSpPr>
+            <a:spLocks noGrp="1"/>
+          </p:cNvSpPr>
+          <p:nvPr>
+            <p:ph type="body" idx="1"/>
+          </p:nvPr>
+        </p:nvSpPr>
+        <p:spPr/>
+        <p:txBody>
+          <a:bodyPr/>
+          <a:lstStyle/>
+          <a:p>
+            <a:r>
+              <a:rPr lang="en-US" dirty="0"/>
+              <a:t>Miscellaneous</a:t>
+            </a:r>
+            <a:endParaRPr lang="tr-TR" dirty="0"/>
+          </a:p>
+        </p:txBody>
+      </p:sp>
+    </p:spTree>
+    <p:extLst>
+      <p:ext uri="{BB962C8B-B14F-4D97-AF65-F5344CB8AC3E}">
+        <p14:creationId xmlns:p14="http://schemas.microsoft.com/office/powerpoint/2010/main" val="4186963766"/>
+      </p:ext>
+    </p:extLst>
+  </p:cSld>
+  <p:clrMapOvr>
+    <a:masterClrMapping/>
+  </p:clrMapOvr>
+  <mc:AlternateContent xmlns:mc="http://schemas.openxmlformats.org/markup-compatibility/2006" xmlns:p14="http://schemas.microsoft.com/office/powerpoint/2010/main">
+    <mc:Choice Requires="p14">
+      <p:transition spd="med" p14:dur="700">
+        <p:fade/>
+      </p:transition>
+    </mc:Choice>
+    <mc:Fallback xmlns="">
+      <p:transition spd="med">
+        <p:fade/>
+      </p:transition>
+    </mc:Fallback>
+  </mc:AlternateContent>
+</p:sld>
+</file>
+
+<file path=ppt/slides/slide61.xml><?xml version="1.0" encoding="utf-8"?>
+<p:sld xmlns:a="http://schemas.openxmlformats.org/drawingml/2006/main" xmlns:r="http://schemas.openxmlformats.org/officeDocument/2006/relationships" xmlns:p="http://schemas.openxmlformats.org/presentationml/2006/main">
+  <p:cSld>
+    <p:spTree>
+      <p:nvGrpSpPr>
+        <p:cNvPr id="1" name=""/>
+        <p:cNvGrpSpPr/>
+        <p:nvPr/>
+      </p:nvGrpSpPr>
+      <p:grpSpPr>
+        <a:xfrm>
+          <a:off x="0" y="0"/>
+          <a:ext cx="0" cy="0"/>
+          <a:chOff x="0" y="0"/>
+          <a:chExt cx="0" cy="0"/>
+        </a:xfrm>
+      </p:grpSpPr>
+      <p:sp>
+        <p:nvSpPr>
+          <p:cNvPr id="2" name="Title 1">
+            <a:extLst>
+              <a:ext uri="{FF2B5EF4-FFF2-40B4-BE49-F238E27FC236}">
+                <a16:creationId xmlns:a16="http://schemas.microsoft.com/office/drawing/2014/main" id="{00069E1A-8A6F-4DC6-8666-9EBE03803AA5}"/>
+              </a:ext>
+            </a:extLst>
+          </p:cNvPr>
+          <p:cNvSpPr>
+            <a:spLocks noGrp="1"/>
+          </p:cNvSpPr>
+          <p:nvPr>
+            <p:ph type="title"/>
+          </p:nvPr>
+        </p:nvSpPr>
+        <p:spPr/>
+        <p:txBody>
+          <a:bodyPr/>
+          <a:lstStyle/>
+          <a:p>
+            <a:r>
+              <a:rPr lang="en-US" dirty="0"/>
+              <a:t>Primary Keys</a:t>
+            </a:r>
+            <a:endParaRPr lang="tr-TR" dirty="0"/>
+          </a:p>
+        </p:txBody>
+      </p:sp>
+      <p:sp>
+        <p:nvSpPr>
+          <p:cNvPr id="3" name="Content Placeholder 2">
+            <a:extLst>
+              <a:ext uri="{FF2B5EF4-FFF2-40B4-BE49-F238E27FC236}">
+                <a16:creationId xmlns:a16="http://schemas.microsoft.com/office/drawing/2014/main" id="{5DD9F222-E0CA-435D-879F-15F56CB27454}"/>
+              </a:ext>
+            </a:extLst>
+          </p:cNvPr>
+          <p:cNvSpPr>
+            <a:spLocks noGrp="1"/>
+          </p:cNvSpPr>
+          <p:nvPr>
+            <p:ph idx="1"/>
+          </p:nvPr>
+        </p:nvSpPr>
+        <p:spPr>
+          <a:xfrm>
+            <a:off x="1295400" y="1981202"/>
+            <a:ext cx="9601200" cy="4102358"/>
+          </a:xfrm>
+        </p:spPr>
+        <p:txBody>
+          <a:bodyPr>
+            <a:normAutofit/>
+          </a:bodyPr>
+          <a:lstStyle/>
+          <a:p>
+            <a:r>
+              <a:rPr lang="en-US" dirty="0"/>
+              <a:t>GUID compared to auto increment (</a:t>
+            </a:r>
+            <a:r>
+              <a:rPr lang="en-US" dirty="0" err="1"/>
+              <a:t>int</a:t>
+            </a:r>
+            <a:r>
+              <a:rPr lang="en-US" dirty="0"/>
+              <a:t>/long)</a:t>
+            </a:r>
+          </a:p>
+          <a:p>
+            <a:pPr lvl="1"/>
+            <a:r>
+              <a:rPr lang="en-US" dirty="0"/>
+              <a:t>Pros</a:t>
+            </a:r>
+          </a:p>
+          <a:p>
+            <a:pPr lvl="2"/>
+            <a:r>
+              <a:rPr lang="en-US" dirty="0"/>
+              <a:t>Client can determine the value. No need to database roundtrip.</a:t>
+            </a:r>
+          </a:p>
+          <a:p>
+            <a:pPr lvl="2"/>
+            <a:r>
+              <a:rPr lang="en-US" dirty="0"/>
+              <a:t>Unique values even between tenants.</a:t>
+            </a:r>
+          </a:p>
+          <a:p>
+            <a:pPr lvl="2"/>
+            <a:r>
+              <a:rPr lang="en-US" dirty="0"/>
+              <a:t>Easier to merge/split/replicate databases.</a:t>
+            </a:r>
+          </a:p>
+          <a:p>
+            <a:pPr lvl="1"/>
+            <a:r>
+              <a:rPr lang="en-US" dirty="0"/>
+              <a:t>Cons</a:t>
+            </a:r>
+          </a:p>
+          <a:p>
+            <a:pPr lvl="2"/>
+            <a:r>
+              <a:rPr lang="en-US" dirty="0"/>
+              <a:t>More data space (16 bytes to 4/8 bytes).</a:t>
+            </a:r>
+          </a:p>
+          <a:p>
+            <a:pPr lvl="1"/>
+            <a:r>
+              <a:rPr lang="en-US" dirty="0"/>
+              <a:t>Gray Area</a:t>
+            </a:r>
+          </a:p>
+          <a:p>
+            <a:pPr lvl="2"/>
+            <a:r>
+              <a:rPr lang="en-US" dirty="0"/>
+              <a:t>Not user/debug friendly Id values. But it’s more secure!</a:t>
+            </a:r>
+          </a:p>
+          <a:p>
+            <a:pPr lvl="1"/>
+            <a:r>
+              <a:rPr lang="en-US" dirty="0"/>
+              <a:t>Notes</a:t>
+            </a:r>
+          </a:p>
+          <a:p>
+            <a:pPr lvl="2"/>
+            <a:r>
+              <a:rPr lang="en-US" dirty="0"/>
+              <a:t>Should use sequential algorithms (important for clustered indexes).</a:t>
+            </a:r>
+            <a:endParaRPr lang="tr-TR" dirty="0"/>
+          </a:p>
+        </p:txBody>
+      </p:sp>
+    </p:spTree>
+    <p:extLst>
+      <p:ext uri="{BB962C8B-B14F-4D97-AF65-F5344CB8AC3E}">
+        <p14:creationId xmlns:p14="http://schemas.microsoft.com/office/powerpoint/2010/main" val="4143215811"/>
+      </p:ext>
+    </p:extLst>
+  </p:cSld>
+  <p:clrMapOvr>
+    <a:masterClrMapping/>
+  </p:clrMapOvr>
+  <mc:AlternateContent xmlns:mc="http://schemas.openxmlformats.org/markup-compatibility/2006" xmlns:p14="http://schemas.microsoft.com/office/powerpoint/2010/main">
+    <mc:Choice Requires="p14">
+      <p:transition spd="med" p14:dur="700">
+        <p:fade/>
+      </p:transition>
+    </mc:Choice>
+    <mc:Fallback xmlns="">
+      <p:transition spd="med">
+        <p:fade/>
+      </p:transition>
+    </mc:Fallback>
+  </mc:AlternateContent>
+</p:sld>
+</file>
+
+<file path=ppt/slides/slide62.xml><?xml version="1.0" encoding="utf-8"?>
+<p:sld xmlns:a="http://schemas.openxmlformats.org/drawingml/2006/main" xmlns:r="http://schemas.openxmlformats.org/officeDocument/2006/relationships" xmlns:p="http://schemas.openxmlformats.org/presentationml/2006/main">
+  <p:cSld>
+    <p:spTree>
+      <p:nvGrpSpPr>
+        <p:cNvPr id="1" name=""/>
+        <p:cNvGrpSpPr/>
+        <p:nvPr/>
+      </p:nvGrpSpPr>
+      <p:grpSpPr>
+        <a:xfrm>
+          <a:off x="0" y="0"/>
+          <a:ext cx="0" cy="0"/>
+          <a:chOff x="0" y="0"/>
+          <a:chExt cx="0" cy="0"/>
+        </a:xfrm>
+      </p:grpSpPr>
+      <p:sp>
+        <p:nvSpPr>
+          <p:cNvPr id="2" name="Title 1">
+            <a:extLst>
+              <a:ext uri="{FF2B5EF4-FFF2-40B4-BE49-F238E27FC236}">
+                <a16:creationId xmlns:a16="http://schemas.microsoft.com/office/drawing/2014/main" id="{D3F48091-F7F3-42A5-BB8D-62122949F77D}"/>
+              </a:ext>
+            </a:extLst>
+          </p:cNvPr>
+          <p:cNvSpPr>
+            <a:spLocks noGrp="1"/>
+          </p:cNvSpPr>
+          <p:nvPr>
+            <p:ph type="title"/>
+          </p:nvPr>
+        </p:nvSpPr>
+        <p:spPr/>
+        <p:txBody>
+          <a:bodyPr/>
+          <a:lstStyle/>
+          <a:p>
+            <a:r>
+              <a:rPr lang="en-US" dirty="0"/>
+              <a:t>Background Jobs / Workers / Services</a:t>
+            </a:r>
+            <a:endParaRPr lang="tr-TR" dirty="0"/>
+          </a:p>
+        </p:txBody>
+      </p:sp>
+      <p:sp>
+        <p:nvSpPr>
+          <p:cNvPr id="3" name="Content Placeholder 2">
+            <a:extLst>
+              <a:ext uri="{FF2B5EF4-FFF2-40B4-BE49-F238E27FC236}">
+                <a16:creationId xmlns:a16="http://schemas.microsoft.com/office/drawing/2014/main" id="{C088121E-3696-4846-9BD4-A1EB10C5009E}"/>
+              </a:ext>
+            </a:extLst>
+          </p:cNvPr>
+          <p:cNvSpPr>
+            <a:spLocks noGrp="1"/>
+          </p:cNvSpPr>
+          <p:nvPr>
+            <p:ph idx="1"/>
+          </p:nvPr>
+        </p:nvSpPr>
+        <p:spPr/>
+        <p:txBody>
+          <a:bodyPr/>
+          <a:lstStyle/>
+          <a:p>
+            <a:r>
+              <a:rPr lang="en-US" dirty="0"/>
+              <a:t>No ambient tenant context!</a:t>
+            </a:r>
+          </a:p>
+          <a:p>
+            <a:r>
+              <a:rPr lang="en-US" dirty="0"/>
+              <a:t>Shared pool of threads between tenants?</a:t>
+            </a:r>
+            <a:endParaRPr lang="tr-TR" dirty="0"/>
+          </a:p>
+        </p:txBody>
+      </p:sp>
+    </p:spTree>
+    <p:extLst>
+      <p:ext uri="{BB962C8B-B14F-4D97-AF65-F5344CB8AC3E}">
+        <p14:creationId xmlns:p14="http://schemas.microsoft.com/office/powerpoint/2010/main" val="1847165873"/>
+      </p:ext>
+    </p:extLst>
+  </p:cSld>
+  <p:clrMapOvr>
+    <a:masterClrMapping/>
+  </p:clrMapOvr>
+  <mc:AlternateContent xmlns:mc="http://schemas.openxmlformats.org/markup-compatibility/2006" xmlns:p14="http://schemas.microsoft.com/office/powerpoint/2010/main">
+    <mc:Choice Requires="p14">
+      <p:transition spd="med" p14:dur="700">
+        <p:fade/>
+      </p:transition>
+    </mc:Choice>
+    <mc:Fallback xmlns="">
+      <p:transition spd="med">
+        <p:fade/>
+      </p:transition>
+    </mc:Fallback>
+  </mc:AlternateContent>
+</p:sld>
+</file>
+
+<file path=ppt/slides/slide63.xml><?xml version="1.0" encoding="utf-8"?>
+<p:sld xmlns:a="http://schemas.openxmlformats.org/drawingml/2006/main" xmlns:r="http://schemas.openxmlformats.org/officeDocument/2006/relationships" xmlns:p="http://schemas.openxmlformats.org/presentationml/2006/main">
+  <p:cSld>
+    <p:spTree>
+      <p:nvGrpSpPr>
+        <p:cNvPr id="1" name=""/>
+        <p:cNvGrpSpPr/>
+        <p:nvPr/>
+      </p:nvGrpSpPr>
+      <p:grpSpPr>
+        <a:xfrm>
+          <a:off x="0" y="0"/>
+          <a:ext cx="0" cy="0"/>
+          <a:chOff x="0" y="0"/>
+          <a:chExt cx="0" cy="0"/>
+        </a:xfrm>
+      </p:grpSpPr>
+      <p:sp>
+        <p:nvSpPr>
+          <p:cNvPr id="2" name="Title 1">
+            <a:extLst>
+              <a:ext uri="{FF2B5EF4-FFF2-40B4-BE49-F238E27FC236}">
+                <a16:creationId xmlns:a16="http://schemas.microsoft.com/office/drawing/2014/main" id="{7C14832D-F170-4F95-8D60-4DCA6BCFF741}"/>
+              </a:ext>
+            </a:extLst>
+          </p:cNvPr>
+          <p:cNvSpPr>
+            <a:spLocks noGrp="1"/>
+          </p:cNvSpPr>
+          <p:nvPr>
+            <p:ph type="title"/>
+          </p:nvPr>
+        </p:nvSpPr>
+        <p:spPr/>
+        <p:txBody>
+          <a:bodyPr/>
+          <a:lstStyle/>
+          <a:p>
+            <a:r>
+              <a:rPr lang="en-US" dirty="0"/>
+              <a:t>Settings (TODO?)</a:t>
+            </a:r>
+            <a:endParaRPr lang="tr-TR" dirty="0"/>
+          </a:p>
+        </p:txBody>
+      </p:sp>
+      <p:sp>
+        <p:nvSpPr>
+          <p:cNvPr id="3" name="Content Placeholder 2">
+            <a:extLst>
+              <a:ext uri="{FF2B5EF4-FFF2-40B4-BE49-F238E27FC236}">
+                <a16:creationId xmlns:a16="http://schemas.microsoft.com/office/drawing/2014/main" id="{C57A8C9C-7BDF-42E7-923E-B54BFB1B9528}"/>
+              </a:ext>
+            </a:extLst>
+          </p:cNvPr>
+          <p:cNvSpPr>
+            <a:spLocks noGrp="1"/>
+          </p:cNvSpPr>
+          <p:nvPr>
+            <p:ph idx="1"/>
+          </p:nvPr>
+        </p:nvSpPr>
+        <p:spPr/>
+        <p:txBody>
+          <a:bodyPr/>
+          <a:lstStyle/>
+          <a:p>
+            <a:r>
+              <a:rPr lang="en-US" dirty="0"/>
+              <a:t>Tenant based settings may override global settings.</a:t>
+            </a:r>
+          </a:p>
+          <a:p>
+            <a:r>
+              <a:rPr lang="en-US" dirty="0"/>
+              <a:t>Some settings may be invisible from tenants.</a:t>
+            </a:r>
+          </a:p>
+          <a:p>
+            <a:r>
+              <a:rPr lang="en-US" dirty="0"/>
+              <a:t>Branding: Tenant logo, colors… etc.</a:t>
+            </a:r>
+          </a:p>
+          <a:p>
+            <a:r>
+              <a:rPr lang="en-US" dirty="0"/>
+              <a:t>Setting fallback: User &gt; Tenant &gt; Global (host) &gt; Hard-Coded</a:t>
+            </a:r>
+            <a:endParaRPr lang="tr-TR" dirty="0"/>
+          </a:p>
+        </p:txBody>
+      </p:sp>
+    </p:spTree>
+    <p:extLst>
+      <p:ext uri="{BB962C8B-B14F-4D97-AF65-F5344CB8AC3E}">
+        <p14:creationId xmlns:p14="http://schemas.microsoft.com/office/powerpoint/2010/main" val="1209030355"/>
+      </p:ext>
+    </p:extLst>
+  </p:cSld>
+  <p:clrMapOvr>
+    <a:masterClrMapping/>
+  </p:clrMapOvr>
+  <mc:AlternateContent xmlns:mc="http://schemas.openxmlformats.org/markup-compatibility/2006" xmlns:p14="http://schemas.microsoft.com/office/powerpoint/2010/main">
+    <mc:Choice Requires="p14">
+      <p:transition spd="med" p14:dur="700">
+        <p:fade/>
+      </p:transition>
+    </mc:Choice>
+    <mc:Fallback xmlns="">
+      <p:transition spd="med">
+        <p:fade/>
+      </p:transition>
+    </mc:Fallback>
+  </mc:AlternateContent>
+</p:sld>
+</file>
+
+<file path=ppt/slides/slide64.xml><?xml version="1.0" encoding="utf-8"?>
+<p:sld xmlns:a="http://schemas.openxmlformats.org/drawingml/2006/main" xmlns:r="http://schemas.openxmlformats.org/officeDocument/2006/relationships" xmlns:p="http://schemas.openxmlformats.org/presentationml/2006/main">
+  <p:cSld>
+    <p:spTree>
+      <p:nvGrpSpPr>
+        <p:cNvPr id="1" name=""/>
+        <p:cNvGrpSpPr/>
+        <p:nvPr/>
+      </p:nvGrpSpPr>
+      <p:grpSpPr>
+        <a:xfrm>
+          <a:off x="0" y="0"/>
+          <a:ext cx="0" cy="0"/>
+          <a:chOff x="0" y="0"/>
+          <a:chExt cx="0" cy="0"/>
+        </a:xfrm>
+      </p:grpSpPr>
+      <p:sp>
+        <p:nvSpPr>
+          <p:cNvPr id="2" name="Title 1">
+            <a:extLst>
+              <a:ext uri="{FF2B5EF4-FFF2-40B4-BE49-F238E27FC236}">
+                <a16:creationId xmlns:a16="http://schemas.microsoft.com/office/drawing/2014/main" id="{609166A2-E8AB-487B-B5C1-0F1DC25B5CB4}"/>
+              </a:ext>
+            </a:extLst>
+          </p:cNvPr>
+          <p:cNvSpPr>
+            <a:spLocks noGrp="1"/>
+          </p:cNvSpPr>
+          <p:nvPr>
+            <p:ph type="title"/>
+          </p:nvPr>
+        </p:nvSpPr>
+        <p:spPr/>
+        <p:txBody>
+          <a:bodyPr/>
+          <a:lstStyle/>
+          <a:p>
+            <a:r>
+              <a:rPr lang="en-US" dirty="0"/>
+              <a:t>Tenant Plug-ins/Services</a:t>
+            </a:r>
+            <a:endParaRPr lang="tr-TR" dirty="0"/>
+          </a:p>
+        </p:txBody>
+      </p:sp>
+      <p:sp>
+        <p:nvSpPr>
+          <p:cNvPr id="3" name="Content Placeholder 2">
+            <a:extLst>
+              <a:ext uri="{FF2B5EF4-FFF2-40B4-BE49-F238E27FC236}">
+                <a16:creationId xmlns:a16="http://schemas.microsoft.com/office/drawing/2014/main" id="{9BFDD6BE-4B8E-454A-9F66-4236C618F560}"/>
+              </a:ext>
+            </a:extLst>
+          </p:cNvPr>
+          <p:cNvSpPr>
+            <a:spLocks noGrp="1"/>
+          </p:cNvSpPr>
+          <p:nvPr>
+            <p:ph idx="1"/>
+          </p:nvPr>
+        </p:nvSpPr>
+        <p:spPr/>
+        <p:txBody>
+          <a:bodyPr/>
+          <a:lstStyle/>
+          <a:p>
+            <a:r>
+              <a:rPr lang="en-US" dirty="0"/>
+              <a:t>How to use different/custom services for different tenants.</a:t>
+            </a:r>
+          </a:p>
+          <a:p>
+            <a:pPr lvl="1"/>
+            <a:r>
+              <a:rPr lang="en-US" dirty="0"/>
+              <a:t>Tenant-aware dependency injection.</a:t>
+            </a:r>
+          </a:p>
+          <a:p>
+            <a:r>
+              <a:rPr lang="en-US" dirty="0"/>
+              <a:t>Container per tenant?</a:t>
+            </a:r>
+          </a:p>
+          <a:p>
+            <a:pPr lvl="1"/>
+            <a:r>
+              <a:rPr lang="en-US" dirty="0"/>
+              <a:t>Combined with Elastic database pool.</a:t>
+            </a:r>
+          </a:p>
+          <a:p>
+            <a:pPr lvl="1"/>
+            <a:r>
+              <a:rPr lang="en-US" dirty="0"/>
+              <a:t>Possibility for multi-versioning.</a:t>
+            </a:r>
+          </a:p>
+          <a:p>
+            <a:pPr lvl="1"/>
+            <a:r>
+              <a:rPr lang="en-US" dirty="0"/>
+              <a:t>Possibility of loading application with tenant-specific plug-ins.</a:t>
+            </a:r>
+          </a:p>
+          <a:p>
+            <a:pPr lvl="1"/>
+            <a:r>
+              <a:rPr lang="en-US" dirty="0"/>
+              <a:t>Different tenants may have different database schemas.</a:t>
+            </a:r>
+          </a:p>
+          <a:p>
+            <a:pPr lvl="1"/>
+            <a:endParaRPr lang="tr-TR" dirty="0"/>
+          </a:p>
+        </p:txBody>
+      </p:sp>
+    </p:spTree>
+    <p:extLst>
+      <p:ext uri="{BB962C8B-B14F-4D97-AF65-F5344CB8AC3E}">
+        <p14:creationId xmlns:p14="http://schemas.microsoft.com/office/powerpoint/2010/main" val="1224564435"/>
       </p:ext>
     </p:extLst>
   </p:cSld>

</xml_diff>